<commit_message>
Added an picture, page number and team name to the slide templates
</commit_message>
<xml_diff>
--- a/Template.pptx
+++ b/Template.pptx
@@ -2,10 +2,17 @@
 <file path=ppt/presentation.xml><?xml version="1.0" encoding="utf-8"?>
 <p:presentation xmlns:a="http://schemas.openxmlformats.org/drawingml/2006/main" xmlns:r="http://schemas.openxmlformats.org/officeDocument/2006/relationships" xmlns:p="http://schemas.openxmlformats.org/presentationml/2006/main" autoCompressPictures="0">
   <p:sldMasterIdLst>
-    <p:sldMasterId id="2147483648" r:id="rId1"/>
+    <p:sldMasterId id="2147483689" r:id="rId1"/>
   </p:sldMasterIdLst>
+  <p:notesMasterIdLst>
+    <p:notesMasterId r:id="rId4"/>
+  </p:notesMasterIdLst>
+  <p:handoutMasterIdLst>
+    <p:handoutMasterId r:id="rId5"/>
+  </p:handoutMasterIdLst>
   <p:sldIdLst>
-    <p:sldId id="256" r:id="rId2"/>
+    <p:sldId id="260" r:id="rId2"/>
+    <p:sldId id="261" r:id="rId3"/>
   </p:sldIdLst>
   <p:sldSz cx="12192000" cy="6858000"/>
   <p:notesSz cx="6858000" cy="9144000"/>
@@ -104,7 +111,629 @@
       </a:defRPr>
     </a:lvl9pPr>
   </p:defaultTextStyle>
+  <p:extLst>
+    <p:ext uri="{EFAFB233-063F-42B5-8137-9DF3F51BA10A}">
+      <p15:sldGuideLst xmlns:p15="http://schemas.microsoft.com/office/powerpoint/2012/main"/>
+    </p:ext>
+  </p:extLst>
 </p:presentation>
+</file>
+
+<file path=ppt/handoutMasters/handoutMaster1.xml><?xml version="1.0" encoding="utf-8"?>
+<p:handoutMaster xmlns:a="http://schemas.openxmlformats.org/drawingml/2006/main" xmlns:r="http://schemas.openxmlformats.org/officeDocument/2006/relationships" xmlns:p="http://schemas.openxmlformats.org/presentationml/2006/main">
+  <p:cSld>
+    <p:bg>
+      <p:bgRef idx="1001">
+        <a:schemeClr val="bg1"/>
+      </p:bgRef>
+    </p:bg>
+    <p:spTree>
+      <p:nvGrpSpPr>
+        <p:cNvPr id="1" name=""/>
+        <p:cNvGrpSpPr/>
+        <p:nvPr/>
+      </p:nvGrpSpPr>
+      <p:grpSpPr>
+        <a:xfrm>
+          <a:off x="0" y="0"/>
+          <a:ext cx="0" cy="0"/>
+          <a:chOff x="0" y="0"/>
+          <a:chExt cx="0" cy="0"/>
+        </a:xfrm>
+      </p:grpSpPr>
+      <p:sp>
+        <p:nvSpPr>
+          <p:cNvPr id="2" name="Контейнер за горния колонтитул 1"/>
+          <p:cNvSpPr>
+            <a:spLocks noGrp="1"/>
+          </p:cNvSpPr>
+          <p:nvPr>
+            <p:ph type="hdr" sz="quarter"/>
+          </p:nvPr>
+        </p:nvSpPr>
+        <p:spPr>
+          <a:xfrm>
+            <a:off x="0" y="0"/>
+            <a:ext cx="2971800" cy="458788"/>
+          </a:xfrm>
+          <a:prstGeom prst="rect">
+            <a:avLst/>
+          </a:prstGeom>
+        </p:spPr>
+        <p:txBody>
+          <a:bodyPr vert="horz" lIns="91440" tIns="45720" rIns="91440" bIns="45720" rtlCol="0"/>
+          <a:lstStyle>
+            <a:lvl1pPr algn="l">
+              <a:defRPr sz="1200"/>
+            </a:lvl1pPr>
+          </a:lstStyle>
+          <a:p>
+            <a:r>
+              <a:rPr lang="en-US" smtClean="0"/>
+              <a:t>Team Lich</a:t>
+            </a:r>
+            <a:endParaRPr lang="bg-BG"/>
+          </a:p>
+        </p:txBody>
+      </p:sp>
+      <p:sp>
+        <p:nvSpPr>
+          <p:cNvPr id="3" name="Контейнер за дата 2"/>
+          <p:cNvSpPr>
+            <a:spLocks noGrp="1"/>
+          </p:cNvSpPr>
+          <p:nvPr>
+            <p:ph type="dt" sz="quarter" idx="1"/>
+          </p:nvPr>
+        </p:nvSpPr>
+        <p:spPr>
+          <a:xfrm>
+            <a:off x="3884613" y="0"/>
+            <a:ext cx="2971800" cy="458788"/>
+          </a:xfrm>
+          <a:prstGeom prst="rect">
+            <a:avLst/>
+          </a:prstGeom>
+        </p:spPr>
+        <p:txBody>
+          <a:bodyPr vert="horz" lIns="91440" tIns="45720" rIns="91440" bIns="45720" rtlCol="0"/>
+          <a:lstStyle>
+            <a:lvl1pPr algn="r">
+              <a:defRPr sz="1200"/>
+            </a:lvl1pPr>
+          </a:lstStyle>
+          <a:p>
+            <a:fld id="{C2691631-68CC-4E9A-97B7-3B658B703893}" type="datetimeFigureOut">
+              <a:rPr lang="bg-BG" smtClean="0"/>
+              <a:t>16.11.2015 г.</a:t>
+            </a:fld>
+            <a:endParaRPr lang="bg-BG"/>
+          </a:p>
+        </p:txBody>
+      </p:sp>
+      <p:sp>
+        <p:nvSpPr>
+          <p:cNvPr id="4" name="Контейнер за долния колонтитул 3"/>
+          <p:cNvSpPr>
+            <a:spLocks noGrp="1"/>
+          </p:cNvSpPr>
+          <p:nvPr>
+            <p:ph type="ftr" sz="quarter" idx="2"/>
+          </p:nvPr>
+        </p:nvSpPr>
+        <p:spPr>
+          <a:xfrm>
+            <a:off x="0" y="8685213"/>
+            <a:ext cx="2971800" cy="458787"/>
+          </a:xfrm>
+          <a:prstGeom prst="rect">
+            <a:avLst/>
+          </a:prstGeom>
+        </p:spPr>
+        <p:txBody>
+          <a:bodyPr vert="horz" lIns="91440" tIns="45720" rIns="91440" bIns="45720" rtlCol="0" anchor="b"/>
+          <a:lstStyle>
+            <a:lvl1pPr algn="l">
+              <a:defRPr sz="1200"/>
+            </a:lvl1pPr>
+          </a:lstStyle>
+          <a:p>
+            <a:r>
+              <a:rPr lang="en-US" smtClean="0"/>
+              <a:t>Team Lich</a:t>
+            </a:r>
+            <a:endParaRPr lang="bg-BG"/>
+          </a:p>
+        </p:txBody>
+      </p:sp>
+      <p:sp>
+        <p:nvSpPr>
+          <p:cNvPr id="5" name="Контейнер за номер на слайда 4"/>
+          <p:cNvSpPr>
+            <a:spLocks noGrp="1"/>
+          </p:cNvSpPr>
+          <p:nvPr>
+            <p:ph type="sldNum" sz="quarter" idx="3"/>
+          </p:nvPr>
+        </p:nvSpPr>
+        <p:spPr>
+          <a:xfrm>
+            <a:off x="3884613" y="8685213"/>
+            <a:ext cx="2971800" cy="458787"/>
+          </a:xfrm>
+          <a:prstGeom prst="rect">
+            <a:avLst/>
+          </a:prstGeom>
+        </p:spPr>
+        <p:txBody>
+          <a:bodyPr vert="horz" lIns="91440" tIns="45720" rIns="91440" bIns="45720" rtlCol="0" anchor="b"/>
+          <a:lstStyle>
+            <a:lvl1pPr algn="r">
+              <a:defRPr sz="1200"/>
+            </a:lvl1pPr>
+          </a:lstStyle>
+          <a:p>
+            <a:fld id="{43473FEB-52EA-4450-A135-CE1AF618EBC2}" type="slidenum">
+              <a:rPr lang="bg-BG" smtClean="0"/>
+              <a:t>‹#›</a:t>
+            </a:fld>
+            <a:endParaRPr lang="bg-BG"/>
+          </a:p>
+        </p:txBody>
+      </p:sp>
+    </p:spTree>
+    <p:extLst>
+      <p:ext uri="{BB962C8B-B14F-4D97-AF65-F5344CB8AC3E}">
+        <p14:creationId xmlns:p14="http://schemas.microsoft.com/office/powerpoint/2010/main" val="3854016581"/>
+      </p:ext>
+    </p:extLst>
+  </p:cSld>
+  <p:clrMap bg1="lt1" tx1="dk1" bg2="lt2" tx2="dk2" accent1="accent1" accent2="accent2" accent3="accent3" accent4="accent4" accent5="accent5" accent6="accent6" hlink="hlink" folHlink="folHlink"/>
+  <p:hf hdr="0" ftr="0" dt="0"/>
+</p:handoutMaster>
+</file>
+
+<file path=ppt/notesMasters/notesMaster1.xml><?xml version="1.0" encoding="utf-8"?>
+<p:notesMaster xmlns:a="http://schemas.openxmlformats.org/drawingml/2006/main" xmlns:r="http://schemas.openxmlformats.org/officeDocument/2006/relationships" xmlns:p="http://schemas.openxmlformats.org/presentationml/2006/main">
+  <p:cSld>
+    <p:bg>
+      <p:bgRef idx="1001">
+        <a:schemeClr val="bg1"/>
+      </p:bgRef>
+    </p:bg>
+    <p:spTree>
+      <p:nvGrpSpPr>
+        <p:cNvPr id="1" name=""/>
+        <p:cNvGrpSpPr/>
+        <p:nvPr/>
+      </p:nvGrpSpPr>
+      <p:grpSpPr>
+        <a:xfrm>
+          <a:off x="0" y="0"/>
+          <a:ext cx="0" cy="0"/>
+          <a:chOff x="0" y="0"/>
+          <a:chExt cx="0" cy="0"/>
+        </a:xfrm>
+      </p:grpSpPr>
+      <p:sp>
+        <p:nvSpPr>
+          <p:cNvPr id="2" name="Контейнер за горния колонтитул 1"/>
+          <p:cNvSpPr>
+            <a:spLocks noGrp="1"/>
+          </p:cNvSpPr>
+          <p:nvPr>
+            <p:ph type="hdr" sz="quarter"/>
+          </p:nvPr>
+        </p:nvSpPr>
+        <p:spPr>
+          <a:xfrm>
+            <a:off x="0" y="0"/>
+            <a:ext cx="2971800" cy="458788"/>
+          </a:xfrm>
+          <a:prstGeom prst="rect">
+            <a:avLst/>
+          </a:prstGeom>
+        </p:spPr>
+        <p:txBody>
+          <a:bodyPr vert="horz" lIns="91440" tIns="45720" rIns="91440" bIns="45720" rtlCol="0"/>
+          <a:lstStyle>
+            <a:lvl1pPr algn="l">
+              <a:defRPr sz="1200"/>
+            </a:lvl1pPr>
+          </a:lstStyle>
+          <a:p>
+            <a:r>
+              <a:rPr lang="en-US" smtClean="0"/>
+              <a:t>Team Lich</a:t>
+            </a:r>
+            <a:endParaRPr lang="bg-BG"/>
+          </a:p>
+        </p:txBody>
+      </p:sp>
+      <p:sp>
+        <p:nvSpPr>
+          <p:cNvPr id="3" name="Контейнер за дата 2"/>
+          <p:cNvSpPr>
+            <a:spLocks noGrp="1"/>
+          </p:cNvSpPr>
+          <p:nvPr>
+            <p:ph type="dt" idx="1"/>
+          </p:nvPr>
+        </p:nvSpPr>
+        <p:spPr>
+          <a:xfrm>
+            <a:off x="3884613" y="0"/>
+            <a:ext cx="2971800" cy="458788"/>
+          </a:xfrm>
+          <a:prstGeom prst="rect">
+            <a:avLst/>
+          </a:prstGeom>
+        </p:spPr>
+        <p:txBody>
+          <a:bodyPr vert="horz" lIns="91440" tIns="45720" rIns="91440" bIns="45720" rtlCol="0"/>
+          <a:lstStyle>
+            <a:lvl1pPr algn="r">
+              <a:defRPr sz="1200"/>
+            </a:lvl1pPr>
+          </a:lstStyle>
+          <a:p>
+            <a:fld id="{BDD945AE-AB37-4316-82F6-75EA950FB326}" type="datetimeFigureOut">
+              <a:rPr lang="bg-BG" smtClean="0"/>
+              <a:t>16.11.2015 г.</a:t>
+            </a:fld>
+            <a:endParaRPr lang="bg-BG"/>
+          </a:p>
+        </p:txBody>
+      </p:sp>
+      <p:sp>
+        <p:nvSpPr>
+          <p:cNvPr id="4" name="Контейнер за изображение на слайда 3"/>
+          <p:cNvSpPr>
+            <a:spLocks noGrp="1" noRot="1" noChangeAspect="1"/>
+          </p:cNvSpPr>
+          <p:nvPr>
+            <p:ph type="sldImg" idx="2"/>
+          </p:nvPr>
+        </p:nvSpPr>
+        <p:spPr>
+          <a:xfrm>
+            <a:off x="685800" y="1143000"/>
+            <a:ext cx="5486400" cy="3086100"/>
+          </a:xfrm>
+          <a:prstGeom prst="rect">
+            <a:avLst/>
+          </a:prstGeom>
+          <a:noFill/>
+          <a:ln w="12700">
+            <a:solidFill>
+              <a:prstClr val="black"/>
+            </a:solidFill>
+          </a:ln>
+        </p:spPr>
+        <p:txBody>
+          <a:bodyPr vert="horz" lIns="91440" tIns="45720" rIns="91440" bIns="45720" rtlCol="0" anchor="ctr"/>
+          <a:lstStyle/>
+          <a:p>
+            <a:endParaRPr lang="bg-BG"/>
+          </a:p>
+        </p:txBody>
+      </p:sp>
+      <p:sp>
+        <p:nvSpPr>
+          <p:cNvPr id="5" name="Контейнер за бележки 4"/>
+          <p:cNvSpPr>
+            <a:spLocks noGrp="1"/>
+          </p:cNvSpPr>
+          <p:nvPr>
+            <p:ph type="body" sz="quarter" idx="3"/>
+          </p:nvPr>
+        </p:nvSpPr>
+        <p:spPr>
+          <a:xfrm>
+            <a:off x="685800" y="4400550"/>
+            <a:ext cx="5486400" cy="3600450"/>
+          </a:xfrm>
+          <a:prstGeom prst="rect">
+            <a:avLst/>
+          </a:prstGeom>
+        </p:spPr>
+        <p:txBody>
+          <a:bodyPr vert="horz" lIns="91440" tIns="45720" rIns="91440" bIns="45720" rtlCol="0"/>
+          <a:lstStyle/>
+          <a:p>
+            <a:pPr lvl="0"/>
+            <a:r>
+              <a:rPr lang="bg-BG" smtClean="0"/>
+              <a:t>Щракнете, за да редактирате стиловете на текста в образеца</a:t>
+            </a:r>
+          </a:p>
+          <a:p>
+            <a:pPr lvl="1"/>
+            <a:r>
+              <a:rPr lang="bg-BG" smtClean="0"/>
+              <a:t>Второ ниво</a:t>
+            </a:r>
+          </a:p>
+          <a:p>
+            <a:pPr lvl="2"/>
+            <a:r>
+              <a:rPr lang="bg-BG" smtClean="0"/>
+              <a:t>Трето ниво</a:t>
+            </a:r>
+          </a:p>
+          <a:p>
+            <a:pPr lvl="3"/>
+            <a:r>
+              <a:rPr lang="bg-BG" smtClean="0"/>
+              <a:t>Четвърто ниво</a:t>
+            </a:r>
+          </a:p>
+          <a:p>
+            <a:pPr lvl="4"/>
+            <a:r>
+              <a:rPr lang="bg-BG" smtClean="0"/>
+              <a:t>Пето ниво</a:t>
+            </a:r>
+            <a:endParaRPr lang="bg-BG"/>
+          </a:p>
+        </p:txBody>
+      </p:sp>
+      <p:sp>
+        <p:nvSpPr>
+          <p:cNvPr id="6" name="Контейнер за долния колонтитул 5"/>
+          <p:cNvSpPr>
+            <a:spLocks noGrp="1"/>
+          </p:cNvSpPr>
+          <p:nvPr>
+            <p:ph type="ftr" sz="quarter" idx="4"/>
+          </p:nvPr>
+        </p:nvSpPr>
+        <p:spPr>
+          <a:xfrm>
+            <a:off x="0" y="8685213"/>
+            <a:ext cx="2971800" cy="458787"/>
+          </a:xfrm>
+          <a:prstGeom prst="rect">
+            <a:avLst/>
+          </a:prstGeom>
+        </p:spPr>
+        <p:txBody>
+          <a:bodyPr vert="horz" lIns="91440" tIns="45720" rIns="91440" bIns="45720" rtlCol="0" anchor="b"/>
+          <a:lstStyle>
+            <a:lvl1pPr algn="l">
+              <a:defRPr sz="1200"/>
+            </a:lvl1pPr>
+          </a:lstStyle>
+          <a:p>
+            <a:r>
+              <a:rPr lang="en-US" smtClean="0"/>
+              <a:t>Team Lich</a:t>
+            </a:r>
+            <a:endParaRPr lang="bg-BG"/>
+          </a:p>
+        </p:txBody>
+      </p:sp>
+      <p:sp>
+        <p:nvSpPr>
+          <p:cNvPr id="7" name="Контейнер за номер на слайда 6"/>
+          <p:cNvSpPr>
+            <a:spLocks noGrp="1"/>
+          </p:cNvSpPr>
+          <p:nvPr>
+            <p:ph type="sldNum" sz="quarter" idx="5"/>
+          </p:nvPr>
+        </p:nvSpPr>
+        <p:spPr>
+          <a:xfrm>
+            <a:off x="3884613" y="8685213"/>
+            <a:ext cx="2971800" cy="458787"/>
+          </a:xfrm>
+          <a:prstGeom prst="rect">
+            <a:avLst/>
+          </a:prstGeom>
+        </p:spPr>
+        <p:txBody>
+          <a:bodyPr vert="horz" lIns="91440" tIns="45720" rIns="91440" bIns="45720" rtlCol="0" anchor="b"/>
+          <a:lstStyle>
+            <a:lvl1pPr algn="r">
+              <a:defRPr sz="1200"/>
+            </a:lvl1pPr>
+          </a:lstStyle>
+          <a:p>
+            <a:fld id="{5BC3A489-183F-4129-9595-78D831772470}" type="slidenum">
+              <a:rPr lang="bg-BG" smtClean="0"/>
+              <a:t>‹#›</a:t>
+            </a:fld>
+            <a:endParaRPr lang="bg-BG"/>
+          </a:p>
+        </p:txBody>
+      </p:sp>
+    </p:spTree>
+    <p:extLst>
+      <p:ext uri="{BB962C8B-B14F-4D97-AF65-F5344CB8AC3E}">
+        <p14:creationId xmlns:p14="http://schemas.microsoft.com/office/powerpoint/2010/main" val="3570319839"/>
+      </p:ext>
+    </p:extLst>
+  </p:cSld>
+  <p:clrMap bg1="lt1" tx1="dk1" bg2="lt2" tx2="dk2" accent1="accent1" accent2="accent2" accent3="accent3" accent4="accent4" accent5="accent5" accent6="accent6" hlink="hlink" folHlink="folHlink"/>
+  <p:hf hdr="0" ftr="0" dt="0"/>
+  <p:notesStyle>
+    <a:lvl1pPr marL="0" algn="l" defTabSz="914400" rtl="0" eaLnBrk="1" latinLnBrk="0" hangingPunct="1">
+      <a:defRPr sz="1200" kern="1200">
+        <a:solidFill>
+          <a:schemeClr val="tx1"/>
+        </a:solidFill>
+        <a:latin typeface="+mn-lt"/>
+        <a:ea typeface="+mn-ea"/>
+        <a:cs typeface="+mn-cs"/>
+      </a:defRPr>
+    </a:lvl1pPr>
+    <a:lvl2pPr marL="457200" algn="l" defTabSz="914400" rtl="0" eaLnBrk="1" latinLnBrk="0" hangingPunct="1">
+      <a:defRPr sz="1200" kern="1200">
+        <a:solidFill>
+          <a:schemeClr val="tx1"/>
+        </a:solidFill>
+        <a:latin typeface="+mn-lt"/>
+        <a:ea typeface="+mn-ea"/>
+        <a:cs typeface="+mn-cs"/>
+      </a:defRPr>
+    </a:lvl2pPr>
+    <a:lvl3pPr marL="914400" algn="l" defTabSz="914400" rtl="0" eaLnBrk="1" latinLnBrk="0" hangingPunct="1">
+      <a:defRPr sz="1200" kern="1200">
+        <a:solidFill>
+          <a:schemeClr val="tx1"/>
+        </a:solidFill>
+        <a:latin typeface="+mn-lt"/>
+        <a:ea typeface="+mn-ea"/>
+        <a:cs typeface="+mn-cs"/>
+      </a:defRPr>
+    </a:lvl3pPr>
+    <a:lvl4pPr marL="1371600" algn="l" defTabSz="914400" rtl="0" eaLnBrk="1" latinLnBrk="0" hangingPunct="1">
+      <a:defRPr sz="1200" kern="1200">
+        <a:solidFill>
+          <a:schemeClr val="tx1"/>
+        </a:solidFill>
+        <a:latin typeface="+mn-lt"/>
+        <a:ea typeface="+mn-ea"/>
+        <a:cs typeface="+mn-cs"/>
+      </a:defRPr>
+    </a:lvl4pPr>
+    <a:lvl5pPr marL="1828800" algn="l" defTabSz="914400" rtl="0" eaLnBrk="1" latinLnBrk="0" hangingPunct="1">
+      <a:defRPr sz="1200" kern="1200">
+        <a:solidFill>
+          <a:schemeClr val="tx1"/>
+        </a:solidFill>
+        <a:latin typeface="+mn-lt"/>
+        <a:ea typeface="+mn-ea"/>
+        <a:cs typeface="+mn-cs"/>
+      </a:defRPr>
+    </a:lvl5pPr>
+    <a:lvl6pPr marL="2286000" algn="l" defTabSz="914400" rtl="0" eaLnBrk="1" latinLnBrk="0" hangingPunct="1">
+      <a:defRPr sz="1200" kern="1200">
+        <a:solidFill>
+          <a:schemeClr val="tx1"/>
+        </a:solidFill>
+        <a:latin typeface="+mn-lt"/>
+        <a:ea typeface="+mn-ea"/>
+        <a:cs typeface="+mn-cs"/>
+      </a:defRPr>
+    </a:lvl6pPr>
+    <a:lvl7pPr marL="2743200" algn="l" defTabSz="914400" rtl="0" eaLnBrk="1" latinLnBrk="0" hangingPunct="1">
+      <a:defRPr sz="1200" kern="1200">
+        <a:solidFill>
+          <a:schemeClr val="tx1"/>
+        </a:solidFill>
+        <a:latin typeface="+mn-lt"/>
+        <a:ea typeface="+mn-ea"/>
+        <a:cs typeface="+mn-cs"/>
+      </a:defRPr>
+    </a:lvl7pPr>
+    <a:lvl8pPr marL="3200400" algn="l" defTabSz="914400" rtl="0" eaLnBrk="1" latinLnBrk="0" hangingPunct="1">
+      <a:defRPr sz="1200" kern="1200">
+        <a:solidFill>
+          <a:schemeClr val="tx1"/>
+        </a:solidFill>
+        <a:latin typeface="+mn-lt"/>
+        <a:ea typeface="+mn-ea"/>
+        <a:cs typeface="+mn-cs"/>
+      </a:defRPr>
+    </a:lvl8pPr>
+    <a:lvl9pPr marL="3657600" algn="l" defTabSz="914400" rtl="0" eaLnBrk="1" latinLnBrk="0" hangingPunct="1">
+      <a:defRPr sz="1200" kern="1200">
+        <a:solidFill>
+          <a:schemeClr val="tx1"/>
+        </a:solidFill>
+        <a:latin typeface="+mn-lt"/>
+        <a:ea typeface="+mn-ea"/>
+        <a:cs typeface="+mn-cs"/>
+      </a:defRPr>
+    </a:lvl9pPr>
+  </p:notesStyle>
+</p:notesMaster>
+</file>
+
+<file path=ppt/notesSlides/notesSlide1.xml><?xml version="1.0" encoding="utf-8"?>
+<p:notes xmlns:a="http://schemas.openxmlformats.org/drawingml/2006/main" xmlns:r="http://schemas.openxmlformats.org/officeDocument/2006/relationships" xmlns:p="http://schemas.openxmlformats.org/presentationml/2006/main">
+  <p:cSld>
+    <p:spTree>
+      <p:nvGrpSpPr>
+        <p:cNvPr id="1" name=""/>
+        <p:cNvGrpSpPr/>
+        <p:nvPr/>
+      </p:nvGrpSpPr>
+      <p:grpSpPr>
+        <a:xfrm>
+          <a:off x="0" y="0"/>
+          <a:ext cx="0" cy="0"/>
+          <a:chOff x="0" y="0"/>
+          <a:chExt cx="0" cy="0"/>
+        </a:xfrm>
+      </p:grpSpPr>
+      <p:sp>
+        <p:nvSpPr>
+          <p:cNvPr id="2" name="Контейнер за изображение на слайда 1"/>
+          <p:cNvSpPr>
+            <a:spLocks noGrp="1" noRot="1" noChangeAspect="1"/>
+          </p:cNvSpPr>
+          <p:nvPr>
+            <p:ph type="sldImg"/>
+          </p:nvPr>
+        </p:nvSpPr>
+        <p:spPr/>
+      </p:sp>
+      <p:sp>
+        <p:nvSpPr>
+          <p:cNvPr id="3" name="Контейнер за бележки 2"/>
+          <p:cNvSpPr>
+            <a:spLocks noGrp="1"/>
+          </p:cNvSpPr>
+          <p:nvPr>
+            <p:ph type="body" idx="1"/>
+          </p:nvPr>
+        </p:nvSpPr>
+        <p:spPr/>
+        <p:txBody>
+          <a:bodyPr/>
+          <a:lstStyle/>
+          <a:p>
+            <a:endParaRPr lang="bg-BG"/>
+          </a:p>
+        </p:txBody>
+      </p:sp>
+      <p:sp>
+        <p:nvSpPr>
+          <p:cNvPr id="4" name="Контейнер за номер на слайда 3"/>
+          <p:cNvSpPr>
+            <a:spLocks noGrp="1"/>
+          </p:cNvSpPr>
+          <p:nvPr>
+            <p:ph type="sldNum" sz="quarter" idx="10"/>
+          </p:nvPr>
+        </p:nvSpPr>
+        <p:spPr/>
+        <p:txBody>
+          <a:bodyPr/>
+          <a:lstStyle/>
+          <a:p>
+            <a:fld id="{5BC3A489-183F-4129-9595-78D831772470}" type="slidenum">
+              <a:rPr lang="bg-BG" smtClean="0"/>
+              <a:t>1</a:t>
+            </a:fld>
+            <a:endParaRPr lang="bg-BG"/>
+          </a:p>
+        </p:txBody>
+      </p:sp>
+    </p:spTree>
+    <p:extLst>
+      <p:ext uri="{BB962C8B-B14F-4D97-AF65-F5344CB8AC3E}">
+        <p14:creationId xmlns:p14="http://schemas.microsoft.com/office/powerpoint/2010/main" val="1780312354"/>
+      </p:ext>
+    </p:extLst>
+  </p:cSld>
+  <p:clrMapOvr>
+    <a:masterClrMapping/>
+  </p:clrMapOvr>
+</p:notes>
 </file>
 
 <file path=ppt/slideLayouts/slideLayout1.xml><?xml version="1.0" encoding="utf-8"?>
@@ -149,8 +778,12 @@
           </a:lstStyle>
           <a:p>
             <a:r>
-              <a:rPr lang="bg-BG" smtClean="0"/>
-              <a:t>Редакт. стил загл. образец</a:t>
+              <a:rPr lang="bg-BG" dirty="0" err="1" smtClean="0"/>
+              <a:t>Редакт</a:t>
+            </a:r>
+            <a:r>
+              <a:rPr lang="bg-BG" dirty="0" smtClean="0"/>
+              <a:t>. стил загл. образец</a:t>
             </a:r>
             <a:endParaRPr lang="en-US" dirty="0"/>
           </a:p>
@@ -288,8 +921,8 @@
           <a:bodyPr/>
           <a:lstStyle/>
           <a:p>
-            <a:fld id="{4AAD347D-5ACD-4C99-B74B-A9C85AD731AF}" type="datetimeFigureOut">
-              <a:rPr lang="en-US" dirty="0"/>
+            <a:fld id="{26C0DC74-94A4-49A2-9957-63741F54B0CA}" type="datetime1">
+              <a:rPr lang="en-US" smtClean="0"/>
               <a:t>11/16/2015</a:t>
             </a:fld>
             <a:endParaRPr lang="en-US" dirty="0"/>
@@ -311,6 +944,10 @@
           <a:bodyPr/>
           <a:lstStyle/>
           <a:p>
+            <a:r>
+              <a:rPr lang="en-US" dirty="0" smtClean="0"/>
+              <a:t>Team Lich</a:t>
+            </a:r>
             <a:endParaRPr lang="en-US" dirty="0"/>
           </a:p>
         </p:txBody>
@@ -331,7 +968,7 @@
           <a:lstStyle/>
           <a:p>
             <a:fld id="{D57F1E4F-1CFF-5643-939E-02111984F565}" type="slidenum">
-              <a:rPr lang="en-US" dirty="0"/>
+              <a:rPr lang="en-US" smtClean="0"/>
               <a:t>‹#›</a:t>
             </a:fld>
             <a:endParaRPr lang="en-US" dirty="0"/>
@@ -339,10 +976,22 @@
         </p:txBody>
       </p:sp>
     </p:spTree>
+    <p:extLst>
+      <p:ext uri="{BB962C8B-B14F-4D97-AF65-F5344CB8AC3E}">
+        <p14:creationId xmlns:p14="http://schemas.microsoft.com/office/powerpoint/2010/main" val="3415723841"/>
+      </p:ext>
+    </p:extLst>
   </p:cSld>
   <p:clrMapOvr>
     <a:masterClrMapping/>
   </p:clrMapOvr>
+  <p:timing>
+    <p:tnLst>
+      <p:par>
+        <p:cTn id="1" dur="indefinite" restart="never" nodeType="tmRoot"/>
+      </p:par>
+    </p:tnLst>
+  </p:timing>
 </p:sldLayout>
 </file>
 
@@ -558,8 +1207,8 @@
           <a:bodyPr/>
           <a:lstStyle/>
           <a:p>
-            <a:fld id="{4509A250-FF31-4206-8172-F9D3106AACB1}" type="datetimeFigureOut">
-              <a:rPr lang="en-US" dirty="0"/>
+            <a:fld id="{A52083E1-B400-43D5-B940-B039FA8164FD}" type="datetime1">
+              <a:rPr lang="en-US" smtClean="0"/>
               <a:t>11/16/2015</a:t>
             </a:fld>
             <a:endParaRPr lang="en-US" dirty="0"/>
@@ -581,6 +1230,10 @@
           <a:bodyPr/>
           <a:lstStyle/>
           <a:p>
+            <a:r>
+              <a:rPr lang="en-US" smtClean="0"/>
+              <a:t>Team Lich</a:t>
+            </a:r>
             <a:endParaRPr lang="en-US" dirty="0"/>
           </a:p>
         </p:txBody>
@@ -601,7 +1254,7 @@
           <a:lstStyle/>
           <a:p>
             <a:fld id="{D57F1E4F-1CFF-5643-939E-02111984F565}" type="slidenum">
-              <a:rPr lang="en-US" dirty="0"/>
+              <a:rPr lang="en-US" smtClean="0"/>
               <a:t>‹#›</a:t>
             </a:fld>
             <a:endParaRPr lang="en-US" dirty="0"/>
@@ -609,10 +1262,22 @@
         </p:txBody>
       </p:sp>
     </p:spTree>
+    <p:extLst>
+      <p:ext uri="{BB962C8B-B14F-4D97-AF65-F5344CB8AC3E}">
+        <p14:creationId xmlns:p14="http://schemas.microsoft.com/office/powerpoint/2010/main" val="3116484368"/>
+      </p:ext>
+    </p:extLst>
   </p:cSld>
   <p:clrMapOvr>
     <a:masterClrMapping/>
   </p:clrMapOvr>
+  <p:timing>
+    <p:tnLst>
+      <p:par>
+        <p:cTn id="1" dur="indefinite" restart="never" nodeType="tmRoot"/>
+      </p:par>
+    </p:tnLst>
+  </p:timing>
 </p:sldLayout>
 </file>
 
@@ -747,8 +1412,8 @@
           <a:bodyPr/>
           <a:lstStyle/>
           <a:p>
-            <a:fld id="{4509A250-FF31-4206-8172-F9D3106AACB1}" type="datetimeFigureOut">
-              <a:rPr lang="en-US" dirty="0"/>
+            <a:fld id="{98EDC592-E70B-46AE-B42B-048F437B0CE6}" type="datetime1">
+              <a:rPr lang="en-US" smtClean="0"/>
               <a:t>11/16/2015</a:t>
             </a:fld>
             <a:endParaRPr lang="en-US" dirty="0"/>
@@ -770,6 +1435,10 @@
           <a:bodyPr/>
           <a:lstStyle/>
           <a:p>
+            <a:r>
+              <a:rPr lang="en-US" smtClean="0"/>
+              <a:t>Team Lich</a:t>
+            </a:r>
             <a:endParaRPr lang="en-US" dirty="0"/>
           </a:p>
         </p:txBody>
@@ -790,7 +1459,7 @@
           <a:lstStyle/>
           <a:p>
             <a:fld id="{D57F1E4F-1CFF-5643-939E-02111984F565}" type="slidenum">
-              <a:rPr lang="en-US" dirty="0"/>
+              <a:rPr lang="en-US" smtClean="0"/>
               <a:t>‹#›</a:t>
             </a:fld>
             <a:endParaRPr lang="en-US" dirty="0"/>
@@ -798,10 +1467,22 @@
         </p:txBody>
       </p:sp>
     </p:spTree>
+    <p:extLst>
+      <p:ext uri="{BB962C8B-B14F-4D97-AF65-F5344CB8AC3E}">
+        <p14:creationId xmlns:p14="http://schemas.microsoft.com/office/powerpoint/2010/main" val="2347067209"/>
+      </p:ext>
+    </p:extLst>
   </p:cSld>
   <p:clrMapOvr>
     <a:masterClrMapping/>
   </p:clrMapOvr>
+  <p:timing>
+    <p:tnLst>
+      <p:par>
+        <p:cTn id="1" dur="indefinite" restart="never" nodeType="tmRoot"/>
+      </p:par>
+    </p:tnLst>
+  </p:timing>
 </p:sldLayout>
 </file>
 
@@ -1010,8 +1691,8 @@
           <a:bodyPr/>
           <a:lstStyle/>
           <a:p>
-            <a:fld id="{4509A250-FF31-4206-8172-F9D3106AACB1}" type="datetimeFigureOut">
-              <a:rPr lang="en-US" dirty="0"/>
+            <a:fld id="{4E100D95-B147-46B9-A968-C9ACBE1537FF}" type="datetime1">
+              <a:rPr lang="en-US" smtClean="0"/>
               <a:t>11/16/2015</a:t>
             </a:fld>
             <a:endParaRPr lang="en-US" dirty="0"/>
@@ -1033,6 +1714,10 @@
           <a:bodyPr/>
           <a:lstStyle/>
           <a:p>
+            <a:r>
+              <a:rPr lang="en-US" smtClean="0"/>
+              <a:t>Team Lich</a:t>
+            </a:r>
             <a:endParaRPr lang="en-US" dirty="0"/>
           </a:p>
         </p:txBody>
@@ -1053,7 +1738,7 @@
           <a:lstStyle/>
           <a:p>
             <a:fld id="{D57F1E4F-1CFF-5643-939E-02111984F565}" type="slidenum">
-              <a:rPr lang="en-US" dirty="0"/>
+              <a:rPr lang="en-US" smtClean="0"/>
               <a:t>‹#›</a:t>
             </a:fld>
             <a:endParaRPr lang="en-US" dirty="0"/>
@@ -1149,10 +1834,22 @@
         </p:txBody>
       </p:sp>
     </p:spTree>
+    <p:extLst>
+      <p:ext uri="{BB962C8B-B14F-4D97-AF65-F5344CB8AC3E}">
+        <p14:creationId xmlns:p14="http://schemas.microsoft.com/office/powerpoint/2010/main" val="3392038743"/>
+      </p:ext>
+    </p:extLst>
   </p:cSld>
   <p:clrMapOvr>
     <a:masterClrMapping/>
   </p:clrMapOvr>
+  <p:timing>
+    <p:tnLst>
+      <p:par>
+        <p:cTn id="1" dur="indefinite" restart="never" nodeType="tmRoot"/>
+      </p:par>
+    </p:tnLst>
+  </p:timing>
 </p:sldLayout>
 </file>
 
@@ -1337,8 +2034,8 @@
           <a:bodyPr/>
           <a:lstStyle/>
           <a:p>
-            <a:fld id="{4509A250-FF31-4206-8172-F9D3106AACB1}" type="datetimeFigureOut">
-              <a:rPr lang="en-US" dirty="0"/>
+            <a:fld id="{6C495452-7ED6-43F8-B194-3DAC878DE1D9}" type="datetime1">
+              <a:rPr lang="en-US" smtClean="0"/>
               <a:t>11/16/2015</a:t>
             </a:fld>
             <a:endParaRPr lang="en-US" dirty="0"/>
@@ -1360,6 +2057,10 @@
           <a:bodyPr/>
           <a:lstStyle/>
           <a:p>
+            <a:r>
+              <a:rPr lang="en-US" smtClean="0"/>
+              <a:t>Team Lich</a:t>
+            </a:r>
             <a:endParaRPr lang="en-US" dirty="0"/>
           </a:p>
         </p:txBody>
@@ -1380,7 +2081,7 @@
           <a:lstStyle/>
           <a:p>
             <a:fld id="{D57F1E4F-1CFF-5643-939E-02111984F565}" type="slidenum">
-              <a:rPr lang="en-US" dirty="0"/>
+              <a:rPr lang="en-US" smtClean="0"/>
               <a:t>‹#›</a:t>
             </a:fld>
             <a:endParaRPr lang="en-US" dirty="0"/>
@@ -1388,10 +2089,22 @@
         </p:txBody>
       </p:sp>
     </p:spTree>
+    <p:extLst>
+      <p:ext uri="{BB962C8B-B14F-4D97-AF65-F5344CB8AC3E}">
+        <p14:creationId xmlns:p14="http://schemas.microsoft.com/office/powerpoint/2010/main" val="2939867430"/>
+      </p:ext>
+    </p:extLst>
   </p:cSld>
   <p:clrMapOvr>
     <a:masterClrMapping/>
   </p:clrMapOvr>
+  <p:timing>
+    <p:tnLst>
+      <p:par>
+        <p:cTn id="1" dur="indefinite" restart="never" nodeType="tmRoot"/>
+      </p:par>
+    </p:tnLst>
+  </p:timing>
 </p:sldLayout>
 </file>
 
@@ -1942,8 +2655,8 @@
           <a:bodyPr/>
           <a:lstStyle/>
           <a:p>
-            <a:fld id="{4509A250-FF31-4206-8172-F9D3106AACB1}" type="datetimeFigureOut">
-              <a:rPr lang="en-US" dirty="0"/>
+            <a:fld id="{D19629A0-F8D8-45B6-A4DE-D3901D51E76D}" type="datetime1">
+              <a:rPr lang="en-US" smtClean="0"/>
               <a:t>11/16/2015</a:t>
             </a:fld>
             <a:endParaRPr lang="en-US" dirty="0"/>
@@ -1965,6 +2678,10 @@
           <a:bodyPr/>
           <a:lstStyle/>
           <a:p>
+            <a:r>
+              <a:rPr lang="en-US" smtClean="0"/>
+              <a:t>Team Lich</a:t>
+            </a:r>
             <a:endParaRPr lang="en-US" dirty="0"/>
           </a:p>
         </p:txBody>
@@ -1985,7 +2702,7 @@
           <a:lstStyle/>
           <a:p>
             <a:fld id="{D57F1E4F-1CFF-5643-939E-02111984F565}" type="slidenum">
-              <a:rPr lang="en-US" dirty="0"/>
+              <a:rPr lang="en-US" smtClean="0"/>
               <a:t>‹#›</a:t>
             </a:fld>
             <a:endParaRPr lang="en-US" dirty="0"/>
@@ -1993,10 +2710,22 @@
         </p:txBody>
       </p:sp>
     </p:spTree>
+    <p:extLst>
+      <p:ext uri="{BB962C8B-B14F-4D97-AF65-F5344CB8AC3E}">
+        <p14:creationId xmlns:p14="http://schemas.microsoft.com/office/powerpoint/2010/main" val="266265109"/>
+      </p:ext>
+    </p:extLst>
   </p:cSld>
   <p:clrMapOvr>
     <a:masterClrMapping/>
   </p:clrMapOvr>
+  <p:timing>
+    <p:tnLst>
+      <p:par>
+        <p:cTn id="1" dur="indefinite" restart="never" nodeType="tmRoot"/>
+      </p:par>
+    </p:tnLst>
+  </p:timing>
 </p:sldLayout>
 </file>
 
@@ -2784,8 +3513,8 @@
           <a:bodyPr/>
           <a:lstStyle/>
           <a:p>
-            <a:fld id="{4509A250-FF31-4206-8172-F9D3106AACB1}" type="datetimeFigureOut">
-              <a:rPr lang="en-US" dirty="0"/>
+            <a:fld id="{0273BC67-CBB4-4B11-A04C-E418E5EEEABA}" type="datetime1">
+              <a:rPr lang="en-US" smtClean="0"/>
               <a:t>11/16/2015</a:t>
             </a:fld>
             <a:endParaRPr lang="en-US" dirty="0"/>
@@ -2807,6 +3536,10 @@
           <a:bodyPr/>
           <a:lstStyle/>
           <a:p>
+            <a:r>
+              <a:rPr lang="en-US" smtClean="0"/>
+              <a:t>Team Lich</a:t>
+            </a:r>
             <a:endParaRPr lang="en-US" dirty="0"/>
           </a:p>
         </p:txBody>
@@ -2827,7 +3560,7 @@
           <a:lstStyle/>
           <a:p>
             <a:fld id="{D57F1E4F-1CFF-5643-939E-02111984F565}" type="slidenum">
-              <a:rPr lang="en-US" dirty="0"/>
+              <a:rPr lang="en-US" smtClean="0"/>
               <a:t>‹#›</a:t>
             </a:fld>
             <a:endParaRPr lang="en-US" dirty="0"/>
@@ -2835,10 +3568,22 @@
         </p:txBody>
       </p:sp>
     </p:spTree>
+    <p:extLst>
+      <p:ext uri="{BB962C8B-B14F-4D97-AF65-F5344CB8AC3E}">
+        <p14:creationId xmlns:p14="http://schemas.microsoft.com/office/powerpoint/2010/main" val="3427624179"/>
+      </p:ext>
+    </p:extLst>
   </p:cSld>
   <p:clrMapOvr>
     <a:masterClrMapping/>
   </p:clrMapOvr>
+  <p:timing>
+    <p:tnLst>
+      <p:par>
+        <p:cTn id="1" dur="indefinite" restart="never" nodeType="tmRoot"/>
+      </p:par>
+    </p:tnLst>
+  </p:timing>
 </p:sldLayout>
 </file>
 
@@ -2949,8 +3694,8 @@
           <a:bodyPr/>
           <a:lstStyle/>
           <a:p>
-            <a:fld id="{4509A250-FF31-4206-8172-F9D3106AACB1}" type="datetimeFigureOut">
-              <a:rPr lang="en-US" dirty="0"/>
+            <a:fld id="{DF308D62-A5F8-4569-8424-02F3D7AC6F27}" type="datetime1">
+              <a:rPr lang="en-US" smtClean="0"/>
               <a:t>11/16/2015</a:t>
             </a:fld>
             <a:endParaRPr lang="en-US" dirty="0"/>
@@ -2972,6 +3717,10 @@
           <a:bodyPr/>
           <a:lstStyle/>
           <a:p>
+            <a:r>
+              <a:rPr lang="en-US" smtClean="0"/>
+              <a:t>Team Lich</a:t>
+            </a:r>
             <a:endParaRPr lang="en-US" dirty="0"/>
           </a:p>
         </p:txBody>
@@ -2992,7 +3741,7 @@
           <a:lstStyle/>
           <a:p>
             <a:fld id="{D57F1E4F-1CFF-5643-939E-02111984F565}" type="slidenum">
-              <a:rPr lang="en-US" dirty="0"/>
+              <a:rPr lang="en-US" smtClean="0"/>
               <a:t>‹#›</a:t>
             </a:fld>
             <a:endParaRPr lang="en-US" dirty="0"/>
@@ -3000,10 +3749,22 @@
         </p:txBody>
       </p:sp>
     </p:spTree>
+    <p:extLst>
+      <p:ext uri="{BB962C8B-B14F-4D97-AF65-F5344CB8AC3E}">
+        <p14:creationId xmlns:p14="http://schemas.microsoft.com/office/powerpoint/2010/main" val="2150705405"/>
+      </p:ext>
+    </p:extLst>
   </p:cSld>
   <p:clrMapOvr>
     <a:masterClrMapping/>
   </p:clrMapOvr>
+  <p:timing>
+    <p:tnLst>
+      <p:par>
+        <p:cTn id="1" dur="indefinite" restart="never" nodeType="tmRoot"/>
+      </p:par>
+    </p:tnLst>
+  </p:timing>
 </p:sldLayout>
 </file>
 
@@ -3124,8 +3885,8 @@
           <a:bodyPr/>
           <a:lstStyle/>
           <a:p>
-            <a:fld id="{4509A250-FF31-4206-8172-F9D3106AACB1}" type="datetimeFigureOut">
-              <a:rPr lang="en-US" dirty="0"/>
+            <a:fld id="{528BEA58-AC52-42D4-9039-370BEC713FB9}" type="datetime1">
+              <a:rPr lang="en-US" smtClean="0"/>
               <a:t>11/16/2015</a:t>
             </a:fld>
             <a:endParaRPr lang="en-US" dirty="0"/>
@@ -3147,6 +3908,10 @@
           <a:bodyPr/>
           <a:lstStyle/>
           <a:p>
+            <a:r>
+              <a:rPr lang="en-US" smtClean="0"/>
+              <a:t>Team Lich</a:t>
+            </a:r>
             <a:endParaRPr lang="en-US" dirty="0"/>
           </a:p>
         </p:txBody>
@@ -3167,7 +3932,7 @@
           <a:lstStyle/>
           <a:p>
             <a:fld id="{D57F1E4F-1CFF-5643-939E-02111984F565}" type="slidenum">
-              <a:rPr lang="en-US" dirty="0"/>
+              <a:rPr lang="en-US" smtClean="0"/>
               <a:t>‹#›</a:t>
             </a:fld>
             <a:endParaRPr lang="en-US" dirty="0"/>
@@ -3175,15 +3940,27 @@
         </p:txBody>
       </p:sp>
     </p:spTree>
+    <p:extLst>
+      <p:ext uri="{BB962C8B-B14F-4D97-AF65-F5344CB8AC3E}">
+        <p14:creationId xmlns:p14="http://schemas.microsoft.com/office/powerpoint/2010/main" val="450286165"/>
+      </p:ext>
+    </p:extLst>
   </p:cSld>
   <p:clrMapOvr>
     <a:masterClrMapping/>
   </p:clrMapOvr>
+  <p:timing>
+    <p:tnLst>
+      <p:par>
+        <p:cTn id="1" dur="indefinite" restart="never" nodeType="tmRoot"/>
+      </p:par>
+    </p:tnLst>
+  </p:timing>
 </p:sldLayout>
 </file>
 
 <file path=ppt/slideLayouts/slideLayout2.xml><?xml version="1.0" encoding="utf-8"?>
-<p:sldLayout xmlns:a="http://schemas.openxmlformats.org/drawingml/2006/main" xmlns:r="http://schemas.openxmlformats.org/officeDocument/2006/relationships" xmlns:p="http://schemas.openxmlformats.org/presentationml/2006/main" type="obj" preserve="1">
+<p:sldLayout xmlns:a="http://schemas.openxmlformats.org/drawingml/2006/main" xmlns:r="http://schemas.openxmlformats.org/officeDocument/2006/relationships" xmlns:p="http://schemas.openxmlformats.org/presentationml/2006/main" preserve="1" userDrawn="1">
   <p:cSld name="Заглавие и съдържание">
     <p:spTree>
       <p:nvGrpSpPr>
@@ -3201,12 +3978,12 @@
       </p:grpSpPr>
       <p:sp>
         <p:nvSpPr>
-          <p:cNvPr id="2" name="Title 1"/>
-          <p:cNvSpPr>
-            <a:spLocks noGrp="1"/>
-          </p:cNvSpPr>
-          <p:nvPr>
-            <p:ph type="title"/>
+          <p:cNvPr id="3" name="Content Placeholder 2"/>
+          <p:cNvSpPr>
+            <a:spLocks noGrp="1"/>
+          </p:cNvSpPr>
+          <p:nvPr>
+            <p:ph idx="1"/>
           </p:nvPr>
         </p:nvSpPr>
         <p:spPr/>
@@ -3214,22 +3991,51 @@
           <a:bodyPr/>
           <a:lstStyle/>
           <a:p>
-            <a:r>
-              <a:rPr lang="bg-BG" smtClean="0"/>
-              <a:t>Редакт. стил загл. образец</a:t>
-            </a:r>
-            <a:endParaRPr lang="en-US" dirty="0"/>
-          </a:p>
-        </p:txBody>
-      </p:sp>
-      <p:sp>
-        <p:nvSpPr>
-          <p:cNvPr id="3" name="Content Placeholder 2"/>
-          <p:cNvSpPr>
-            <a:spLocks noGrp="1"/>
-          </p:cNvSpPr>
-          <p:nvPr>
-            <p:ph idx="1"/>
+            <a:pPr lvl="0"/>
+            <a:r>
+              <a:rPr lang="bg-BG" smtClean="0"/>
+              <a:t>Щракнете, за да редактирате стиловете на текста в образеца</a:t>
+            </a:r>
+          </a:p>
+          <a:p>
+            <a:pPr lvl="1"/>
+            <a:r>
+              <a:rPr lang="bg-BG" smtClean="0"/>
+              <a:t>Второ ниво</a:t>
+            </a:r>
+          </a:p>
+          <a:p>
+            <a:pPr lvl="2"/>
+            <a:r>
+              <a:rPr lang="bg-BG" smtClean="0"/>
+              <a:t>Трето ниво</a:t>
+            </a:r>
+          </a:p>
+          <a:p>
+            <a:pPr lvl="3"/>
+            <a:r>
+              <a:rPr lang="bg-BG" smtClean="0"/>
+              <a:t>Четвърто ниво</a:t>
+            </a:r>
+          </a:p>
+          <a:p>
+            <a:pPr lvl="4"/>
+            <a:r>
+              <a:rPr lang="bg-BG" smtClean="0"/>
+              <a:t>Пето ниво</a:t>
+            </a:r>
+            <a:endParaRPr lang="en-US" dirty="0"/>
+          </a:p>
+        </p:txBody>
+      </p:sp>
+      <p:sp>
+        <p:nvSpPr>
+          <p:cNvPr id="13" name="Заглавие 12"/>
+          <p:cNvSpPr>
+            <a:spLocks noGrp="1"/>
+          </p:cNvSpPr>
+          <p:nvPr>
+            <p:ph type="title"/>
           </p:nvPr>
         </p:nvSpPr>
         <p:spPr/>
@@ -3237,46 +4043,17 @@
           <a:bodyPr/>
           <a:lstStyle/>
           <a:p>
-            <a:pPr lvl="0"/>
-            <a:r>
-              <a:rPr lang="bg-BG" smtClean="0"/>
-              <a:t>Щракнете, за да редактирате стиловете на текста в образеца</a:t>
-            </a:r>
-          </a:p>
-          <a:p>
-            <a:pPr lvl="1"/>
-            <a:r>
-              <a:rPr lang="bg-BG" smtClean="0"/>
-              <a:t>Второ ниво</a:t>
-            </a:r>
-          </a:p>
-          <a:p>
-            <a:pPr lvl="2"/>
-            <a:r>
-              <a:rPr lang="bg-BG" smtClean="0"/>
-              <a:t>Трето ниво</a:t>
-            </a:r>
-          </a:p>
-          <a:p>
-            <a:pPr lvl="3"/>
-            <a:r>
-              <a:rPr lang="bg-BG" smtClean="0"/>
-              <a:t>Четвърто ниво</a:t>
-            </a:r>
-          </a:p>
-          <a:p>
-            <a:pPr lvl="4"/>
-            <a:r>
-              <a:rPr lang="bg-BG" smtClean="0"/>
-              <a:t>Пето ниво</a:t>
-            </a:r>
-            <a:endParaRPr lang="en-US" dirty="0"/>
-          </a:p>
-        </p:txBody>
-      </p:sp>
-      <p:sp>
-        <p:nvSpPr>
-          <p:cNvPr id="4" name="Date Placeholder 3"/>
+            <a:r>
+              <a:rPr lang="bg-BG" smtClean="0"/>
+              <a:t>Редакт. стил загл. образец</a:t>
+            </a:r>
+            <a:endParaRPr lang="bg-BG"/>
+          </a:p>
+        </p:txBody>
+      </p:sp>
+      <p:sp>
+        <p:nvSpPr>
+          <p:cNvPr id="17" name="Контейнер за дата 16"/>
           <p:cNvSpPr>
             <a:spLocks noGrp="1"/>
           </p:cNvSpPr>
@@ -3289,8 +4066,8 @@
           <a:bodyPr/>
           <a:lstStyle/>
           <a:p>
-            <a:fld id="{4509A250-FF31-4206-8172-F9D3106AACB1}" type="datetimeFigureOut">
-              <a:rPr lang="en-US" dirty="0"/>
+            <a:fld id="{574FCB84-BE1B-414A-AF93-2955FAD4082F}" type="datetime1">
+              <a:rPr lang="en-US" smtClean="0"/>
               <a:t>11/16/2015</a:t>
             </a:fld>
             <a:endParaRPr lang="en-US" dirty="0"/>
@@ -3299,7 +4076,7 @@
       </p:sp>
       <p:sp>
         <p:nvSpPr>
-          <p:cNvPr id="5" name="Footer Placeholder 4"/>
+          <p:cNvPr id="18" name="Контейнер за долния колонтитул 17"/>
           <p:cNvSpPr>
             <a:spLocks noGrp="1"/>
           </p:cNvSpPr>
@@ -3312,13 +4089,17 @@
           <a:bodyPr/>
           <a:lstStyle/>
           <a:p>
-            <a:endParaRPr lang="en-US" dirty="0"/>
-          </a:p>
-        </p:txBody>
-      </p:sp>
-      <p:sp>
-        <p:nvSpPr>
-          <p:cNvPr id="6" name="Slide Number Placeholder 5"/>
+            <a:r>
+              <a:rPr lang="en-US" smtClean="0"/>
+              <a:t>Team Lich</a:t>
+            </a:r>
+            <a:endParaRPr lang="en-US" dirty="0"/>
+          </a:p>
+        </p:txBody>
+      </p:sp>
+      <p:sp>
+        <p:nvSpPr>
+          <p:cNvPr id="19" name="Контейнер за номер на слайда 18"/>
           <p:cNvSpPr>
             <a:spLocks noGrp="1"/>
           </p:cNvSpPr>
@@ -3332,7 +4113,7 @@
           <a:lstStyle/>
           <a:p>
             <a:fld id="{D57F1E4F-1CFF-5643-939E-02111984F565}" type="slidenum">
-              <a:rPr lang="en-US" dirty="0"/>
+              <a:rPr lang="en-US" smtClean="0"/>
               <a:t>‹#›</a:t>
             </a:fld>
             <a:endParaRPr lang="en-US" dirty="0"/>
@@ -3340,10 +4121,22 @@
         </p:txBody>
       </p:sp>
     </p:spTree>
+    <p:extLst>
+      <p:ext uri="{BB962C8B-B14F-4D97-AF65-F5344CB8AC3E}">
+        <p14:creationId xmlns:p14="http://schemas.microsoft.com/office/powerpoint/2010/main" val="4083059136"/>
+      </p:ext>
+    </p:extLst>
   </p:cSld>
   <p:clrMapOvr>
     <a:masterClrMapping/>
   </p:clrMapOvr>
+  <p:timing>
+    <p:tnLst>
+      <p:par>
+        <p:cTn id="1" dur="indefinite" restart="never" nodeType="tmRoot"/>
+      </p:par>
+    </p:tnLst>
+  </p:timing>
 </p:sldLayout>
 </file>
 
@@ -3528,8 +4321,8 @@
           <a:bodyPr/>
           <a:lstStyle/>
           <a:p>
-            <a:fld id="{4509A250-FF31-4206-8172-F9D3106AACB1}" type="datetimeFigureOut">
-              <a:rPr lang="en-US" dirty="0"/>
+            <a:fld id="{58993F03-696B-45F5-97BD-82595B1D170E}" type="datetime1">
+              <a:rPr lang="en-US" smtClean="0"/>
               <a:t>11/16/2015</a:t>
             </a:fld>
             <a:endParaRPr lang="en-US" dirty="0"/>
@@ -3551,6 +4344,10 @@
           <a:bodyPr/>
           <a:lstStyle/>
           <a:p>
+            <a:r>
+              <a:rPr lang="en-US" smtClean="0"/>
+              <a:t>Team Lich</a:t>
+            </a:r>
             <a:endParaRPr lang="en-US" dirty="0"/>
           </a:p>
         </p:txBody>
@@ -3571,7 +4368,7 @@
           <a:lstStyle/>
           <a:p>
             <a:fld id="{D57F1E4F-1CFF-5643-939E-02111984F565}" type="slidenum">
-              <a:rPr lang="en-US" dirty="0"/>
+              <a:rPr lang="en-US" smtClean="0"/>
               <a:t>‹#›</a:t>
             </a:fld>
             <a:endParaRPr lang="en-US" dirty="0"/>
@@ -3579,10 +4376,22 @@
         </p:txBody>
       </p:sp>
     </p:spTree>
+    <p:extLst>
+      <p:ext uri="{BB962C8B-B14F-4D97-AF65-F5344CB8AC3E}">
+        <p14:creationId xmlns:p14="http://schemas.microsoft.com/office/powerpoint/2010/main" val="3947545764"/>
+      </p:ext>
+    </p:extLst>
   </p:cSld>
   <p:clrMapOvr>
     <a:masterClrMapping/>
   </p:clrMapOvr>
+  <p:timing>
+    <p:tnLst>
+      <p:par>
+        <p:cTn id="1" dur="indefinite" restart="never" nodeType="tmRoot"/>
+      </p:par>
+    </p:tnLst>
+  </p:timing>
 </p:sldLayout>
 </file>
 
@@ -3815,8 +4624,8 @@
           <a:bodyPr/>
           <a:lstStyle/>
           <a:p>
-            <a:fld id="{4509A250-FF31-4206-8172-F9D3106AACB1}" type="datetimeFigureOut">
-              <a:rPr lang="en-US" dirty="0"/>
+            <a:fld id="{74DDE0F2-85FD-44AA-95D3-DC5FFCFF9764}" type="datetime1">
+              <a:rPr lang="en-US" smtClean="0"/>
               <a:t>11/16/2015</a:t>
             </a:fld>
             <a:endParaRPr lang="en-US" dirty="0"/>
@@ -3838,6 +4647,10 @@
           <a:bodyPr/>
           <a:lstStyle/>
           <a:p>
+            <a:r>
+              <a:rPr lang="en-US" smtClean="0"/>
+              <a:t>Team Lich</a:t>
+            </a:r>
             <a:endParaRPr lang="en-US" dirty="0"/>
           </a:p>
         </p:txBody>
@@ -3858,7 +4671,7 @@
           <a:lstStyle/>
           <a:p>
             <a:fld id="{D57F1E4F-1CFF-5643-939E-02111984F565}" type="slidenum">
-              <a:rPr lang="en-US" dirty="0"/>
+              <a:rPr lang="en-US" smtClean="0"/>
               <a:t>‹#›</a:t>
             </a:fld>
             <a:endParaRPr lang="en-US" dirty="0"/>
@@ -3866,6 +4679,11 @@
         </p:txBody>
       </p:sp>
     </p:spTree>
+    <p:extLst>
+      <p:ext uri="{BB962C8B-B14F-4D97-AF65-F5344CB8AC3E}">
+        <p14:creationId xmlns:p14="http://schemas.microsoft.com/office/powerpoint/2010/main" val="718448629"/>
+      </p:ext>
+    </p:extLst>
   </p:cSld>
   <p:clrMapOvr>
     <a:masterClrMapping/>
@@ -4248,8 +5066,8 @@
           <a:bodyPr/>
           <a:lstStyle/>
           <a:p>
-            <a:fld id="{4509A250-FF31-4206-8172-F9D3106AACB1}" type="datetimeFigureOut">
-              <a:rPr lang="en-US" dirty="0"/>
+            <a:fld id="{7F7D6B47-E70C-4A4B-A6A9-8ABE67C59366}" type="datetime1">
+              <a:rPr lang="en-US" smtClean="0"/>
               <a:t>11/16/2015</a:t>
             </a:fld>
             <a:endParaRPr lang="en-US" dirty="0"/>
@@ -4271,6 +5089,10 @@
           <a:bodyPr/>
           <a:lstStyle/>
           <a:p>
+            <a:r>
+              <a:rPr lang="en-US" smtClean="0"/>
+              <a:t>Team Lich</a:t>
+            </a:r>
             <a:endParaRPr lang="en-US" dirty="0"/>
           </a:p>
         </p:txBody>
@@ -4291,7 +5113,7 @@
           <a:lstStyle/>
           <a:p>
             <a:fld id="{D57F1E4F-1CFF-5643-939E-02111984F565}" type="slidenum">
-              <a:rPr lang="en-US" dirty="0"/>
+              <a:rPr lang="en-US" smtClean="0"/>
               <a:t>‹#›</a:t>
             </a:fld>
             <a:endParaRPr lang="en-US" dirty="0"/>
@@ -4299,10 +5121,22 @@
         </p:txBody>
       </p:sp>
     </p:spTree>
+    <p:extLst>
+      <p:ext uri="{BB962C8B-B14F-4D97-AF65-F5344CB8AC3E}">
+        <p14:creationId xmlns:p14="http://schemas.microsoft.com/office/powerpoint/2010/main" val="3024175284"/>
+      </p:ext>
+    </p:extLst>
   </p:cSld>
   <p:clrMapOvr>
     <a:masterClrMapping/>
   </p:clrMapOvr>
+  <p:timing>
+    <p:tnLst>
+      <p:par>
+        <p:cTn id="1" dur="indefinite" restart="never" nodeType="tmRoot"/>
+      </p:par>
+    </p:tnLst>
+  </p:timing>
 </p:sldLayout>
 </file>
 
@@ -4361,8 +5195,8 @@
           <a:bodyPr/>
           <a:lstStyle/>
           <a:p>
-            <a:fld id="{4509A250-FF31-4206-8172-F9D3106AACB1}" type="datetimeFigureOut">
-              <a:rPr lang="en-US" dirty="0"/>
+            <a:fld id="{DE1AF68E-84C3-47E6-A621-5D56BA5968A9}" type="datetime1">
+              <a:rPr lang="en-US" smtClean="0"/>
               <a:t>11/16/2015</a:t>
             </a:fld>
             <a:endParaRPr lang="en-US" dirty="0"/>
@@ -4384,6 +5218,10 @@
           <a:bodyPr/>
           <a:lstStyle/>
           <a:p>
+            <a:r>
+              <a:rPr lang="en-US" smtClean="0"/>
+              <a:t>Team Lich</a:t>
+            </a:r>
             <a:endParaRPr lang="en-US" dirty="0"/>
           </a:p>
         </p:txBody>
@@ -4404,7 +5242,7 @@
           <a:lstStyle/>
           <a:p>
             <a:fld id="{D57F1E4F-1CFF-5643-939E-02111984F565}" type="slidenum">
-              <a:rPr lang="en-US" dirty="0"/>
+              <a:rPr lang="en-US" smtClean="0"/>
               <a:t>‹#›</a:t>
             </a:fld>
             <a:endParaRPr lang="en-US" dirty="0"/>
@@ -4412,10 +5250,22 @@
         </p:txBody>
       </p:sp>
     </p:spTree>
+    <p:extLst>
+      <p:ext uri="{BB962C8B-B14F-4D97-AF65-F5344CB8AC3E}">
+        <p14:creationId xmlns:p14="http://schemas.microsoft.com/office/powerpoint/2010/main" val="4096822547"/>
+      </p:ext>
+    </p:extLst>
   </p:cSld>
   <p:clrMapOvr>
     <a:masterClrMapping/>
   </p:clrMapOvr>
+  <p:timing>
+    <p:tnLst>
+      <p:par>
+        <p:cTn id="1" dur="indefinite" restart="never" nodeType="tmRoot"/>
+      </p:par>
+    </p:tnLst>
+  </p:timing>
 </p:sldLayout>
 </file>
 
@@ -4451,8 +5301,8 @@
           <a:bodyPr/>
           <a:lstStyle/>
           <a:p>
-            <a:fld id="{4509A250-FF31-4206-8172-F9D3106AACB1}" type="datetimeFigureOut">
-              <a:rPr lang="en-US" dirty="0"/>
+            <a:fld id="{39DC2972-6F5A-41A9-9A2B-4C4D14F9CE1E}" type="datetime1">
+              <a:rPr lang="en-US" smtClean="0"/>
               <a:t>11/16/2015</a:t>
             </a:fld>
             <a:endParaRPr lang="en-US" dirty="0"/>
@@ -4474,6 +5324,10 @@
           <a:bodyPr/>
           <a:lstStyle/>
           <a:p>
+            <a:r>
+              <a:rPr lang="en-US" smtClean="0"/>
+              <a:t>Team Lich</a:t>
+            </a:r>
             <a:endParaRPr lang="en-US" dirty="0"/>
           </a:p>
         </p:txBody>
@@ -4494,7 +5348,7 @@
           <a:lstStyle/>
           <a:p>
             <a:fld id="{D57F1E4F-1CFF-5643-939E-02111984F565}" type="slidenum">
-              <a:rPr lang="en-US" dirty="0"/>
+              <a:rPr lang="en-US" smtClean="0"/>
               <a:t>‹#›</a:t>
             </a:fld>
             <a:endParaRPr lang="en-US" dirty="0"/>
@@ -4502,6 +5356,11 @@
         </p:txBody>
       </p:sp>
     </p:spTree>
+    <p:extLst>
+      <p:ext uri="{BB962C8B-B14F-4D97-AF65-F5344CB8AC3E}">
+        <p14:creationId xmlns:p14="http://schemas.microsoft.com/office/powerpoint/2010/main" val="130957861"/>
+      </p:ext>
+    </p:extLst>
   </p:cSld>
   <p:clrMapOvr>
     <a:masterClrMapping/>
@@ -4725,8 +5584,8 @@
           <a:bodyPr/>
           <a:lstStyle/>
           <a:p>
-            <a:fld id="{4509A250-FF31-4206-8172-F9D3106AACB1}" type="datetimeFigureOut">
-              <a:rPr lang="en-US" dirty="0"/>
+            <a:fld id="{834DF7F5-21A6-4651-8D13-E44A5CC1BFF7}" type="datetime1">
+              <a:rPr lang="en-US" smtClean="0"/>
               <a:t>11/16/2015</a:t>
             </a:fld>
             <a:endParaRPr lang="en-US" dirty="0"/>
@@ -4748,6 +5607,10 @@
           <a:bodyPr/>
           <a:lstStyle/>
           <a:p>
+            <a:r>
+              <a:rPr lang="en-US" smtClean="0"/>
+              <a:t>Team Lich</a:t>
+            </a:r>
             <a:endParaRPr lang="en-US" dirty="0"/>
           </a:p>
         </p:txBody>
@@ -4768,7 +5631,7 @@
           <a:lstStyle/>
           <a:p>
             <a:fld id="{D57F1E4F-1CFF-5643-939E-02111984F565}" type="slidenum">
-              <a:rPr lang="en-US" dirty="0"/>
+              <a:rPr lang="en-US" smtClean="0"/>
               <a:t>‹#›</a:t>
             </a:fld>
             <a:endParaRPr lang="en-US" dirty="0"/>
@@ -4776,10 +5639,22 @@
         </p:txBody>
       </p:sp>
     </p:spTree>
+    <p:extLst>
+      <p:ext uri="{BB962C8B-B14F-4D97-AF65-F5344CB8AC3E}">
+        <p14:creationId xmlns:p14="http://schemas.microsoft.com/office/powerpoint/2010/main" val="93190530"/>
+      </p:ext>
+    </p:extLst>
   </p:cSld>
   <p:clrMapOvr>
     <a:masterClrMapping/>
   </p:clrMapOvr>
+  <p:timing>
+    <p:tnLst>
+      <p:par>
+        <p:cTn id="1" dur="indefinite" restart="never" nodeType="tmRoot"/>
+      </p:par>
+    </p:tnLst>
+  </p:timing>
 </p:sldLayout>
 </file>
 
@@ -4995,8 +5870,8 @@
           <a:bodyPr/>
           <a:lstStyle/>
           <a:p>
-            <a:fld id="{4509A250-FF31-4206-8172-F9D3106AACB1}" type="datetimeFigureOut">
-              <a:rPr lang="en-US" dirty="0"/>
+            <a:fld id="{3CE04DF1-A3CC-44A0-A672-F80561DCCB12}" type="datetime1">
+              <a:rPr lang="en-US" smtClean="0"/>
               <a:t>11/16/2015</a:t>
             </a:fld>
             <a:endParaRPr lang="en-US" dirty="0"/>
@@ -5018,6 +5893,10 @@
           <a:bodyPr/>
           <a:lstStyle/>
           <a:p>
+            <a:r>
+              <a:rPr lang="en-US" smtClean="0"/>
+              <a:t>Team Lich</a:t>
+            </a:r>
             <a:endParaRPr lang="en-US" dirty="0"/>
           </a:p>
         </p:txBody>
@@ -5038,7 +5917,7 @@
           <a:lstStyle/>
           <a:p>
             <a:fld id="{D57F1E4F-1CFF-5643-939E-02111984F565}" type="slidenum">
-              <a:rPr lang="en-US" dirty="0"/>
+              <a:rPr lang="en-US" smtClean="0"/>
               <a:t>‹#›</a:t>
             </a:fld>
             <a:endParaRPr lang="en-US" dirty="0"/>
@@ -5046,10 +5925,22 @@
         </p:txBody>
       </p:sp>
     </p:spTree>
+    <p:extLst>
+      <p:ext uri="{BB962C8B-B14F-4D97-AF65-F5344CB8AC3E}">
+        <p14:creationId xmlns:p14="http://schemas.microsoft.com/office/powerpoint/2010/main" val="735959334"/>
+      </p:ext>
+    </p:extLst>
   </p:cSld>
   <p:clrMapOvr>
     <a:masterClrMapping/>
   </p:clrMapOvr>
+  <p:timing>
+    <p:tnLst>
+      <p:par>
+        <p:cTn id="1" dur="indefinite" restart="never" nodeType="tmRoot"/>
+      </p:par>
+    </p:tnLst>
+  </p:timing>
 </p:sldLayout>
 </file>
 
@@ -5077,6 +5968,36 @@
       </p:grpSpPr>
       <p:pic>
         <p:nvPicPr>
+          <p:cNvPr id="13" name="Картина 12"/>
+          <p:cNvPicPr>
+            <a:picLocks noChangeAspect="1"/>
+          </p:cNvPicPr>
+          <p:nvPr userDrawn="1"/>
+        </p:nvPicPr>
+        <p:blipFill>
+          <a:blip r:embed="rId19">
+            <a:extLst>
+              <a:ext uri="{28A0092B-C50C-407E-A947-70E740481C1C}">
+                <a14:useLocalDpi xmlns:a14="http://schemas.microsoft.com/office/drawing/2010/main" val="0"/>
+              </a:ext>
+            </a:extLst>
+          </a:blip>
+          <a:stretch>
+            <a:fillRect/>
+          </a:stretch>
+        </p:blipFill>
+        <p:spPr>
+          <a:xfrm>
+            <a:off x="9904409" y="3233921"/>
+            <a:ext cx="2438405" cy="3624079"/>
+          </a:xfrm>
+          <a:prstGeom prst="rect">
+            <a:avLst/>
+          </a:prstGeom>
+        </p:spPr>
+      </p:pic>
+      <p:pic>
+        <p:nvPicPr>
           <p:cNvPr id="8" name="Picture 7"/>
           <p:cNvPicPr>
             <a:picLocks noChangeAspect="1"/>
@@ -5084,7 +6005,7 @@
           <p:nvPr/>
         </p:nvPicPr>
         <p:blipFill rotWithShape="1">
-          <a:blip r:embed="rId19">
+          <a:blip r:embed="rId20">
             <a:extLst>
               <a:ext uri="{28A0092B-C50C-407E-A947-70E740481C1C}">
                 <a14:useLocalDpi xmlns:a14="http://schemas.microsoft.com/office/drawing/2010/main" val="0"/>
@@ -5113,7 +6034,7 @@
           <p:nvPr/>
         </p:nvPicPr>
         <p:blipFill rotWithShape="1">
-          <a:blip r:embed="rId20">
+          <a:blip r:embed="rId21">
             <a:extLst>
               <a:ext uri="{28A0092B-C50C-407E-A947-70E740481C1C}">
                 <a14:useLocalDpi xmlns:a14="http://schemas.microsoft.com/office/drawing/2010/main" val="0"/>
@@ -5205,7 +6126,7 @@
           <p:nvPr/>
         </p:nvPicPr>
         <p:blipFill rotWithShape="1">
-          <a:blip r:embed="rId21">
+          <a:blip r:embed="rId22">
             <a:extLst>
               <a:ext uri="{28A0092B-C50C-407E-A947-70E740481C1C}">
                 <a14:useLocalDpi xmlns:a14="http://schemas.microsoft.com/office/drawing/2010/main" val="0"/>
@@ -5234,7 +6155,7 @@
           <p:nvPr/>
         </p:nvPicPr>
         <p:blipFill rotWithShape="1">
-          <a:blip r:embed="rId22">
+          <a:blip r:embed="rId23">
             <a:extLst>
               <a:ext uri="{28A0092B-C50C-407E-A947-70E740481C1C}">
                 <a14:useLocalDpi xmlns:a14="http://schemas.microsoft.com/office/drawing/2010/main" val="0"/>
@@ -5269,7 +6190,9 @@
             <a:avLst/>
           </a:prstGeom>
           <a:solidFill>
-            <a:schemeClr val="accent1"/>
+            <a:schemeClr val="tx2">
+              <a:lumMod val="50000"/>
+            </a:schemeClr>
           </a:solidFill>
           <a:ln>
             <a:noFill/>
@@ -5350,35 +6273,35 @@
           <a:p>
             <a:pPr lvl="0"/>
             <a:r>
-              <a:rPr lang="bg-BG" smtClean="0"/>
+              <a:rPr lang="bg-BG" dirty="0" smtClean="0"/>
               <a:t>Щракнете, за да редактирате стиловете на текста в образеца</a:t>
             </a:r>
           </a:p>
           <a:p>
             <a:pPr lvl="1"/>
             <a:r>
-              <a:rPr lang="bg-BG" smtClean="0"/>
+              <a:rPr lang="bg-BG" dirty="0" smtClean="0"/>
               <a:t>Второ ниво</a:t>
             </a:r>
           </a:p>
           <a:p>
             <a:pPr lvl="2"/>
             <a:r>
-              <a:rPr lang="bg-BG" smtClean="0"/>
+              <a:rPr lang="bg-BG" dirty="0" smtClean="0"/>
               <a:t>Трето ниво</a:t>
             </a:r>
           </a:p>
           <a:p>
             <a:pPr lvl="3"/>
             <a:r>
-              <a:rPr lang="bg-BG" smtClean="0"/>
+              <a:rPr lang="bg-BG" dirty="0" smtClean="0"/>
               <a:t>Четвърто ниво</a:t>
             </a:r>
           </a:p>
           <a:p>
             <a:pPr lvl="4"/>
             <a:r>
-              <a:rPr lang="bg-BG" smtClean="0"/>
+              <a:rPr lang="bg-BG" dirty="0" smtClean="0"/>
               <a:t>Пето ниво</a:t>
             </a:r>
             <a:endParaRPr lang="en-US" dirty="0"/>
@@ -5419,8 +6342,8 @@
             </a:lvl1pPr>
           </a:lstStyle>
           <a:p>
-            <a:fld id="{4509A250-FF31-4206-8172-F9D3106AACB1}" type="datetimeFigureOut">
-              <a:rPr lang="en-US" dirty="0"/>
+            <a:fld id="{269849C7-1568-45AD-8E19-70887F7FEEB6}" type="datetime1">
+              <a:rPr lang="en-US" smtClean="0"/>
               <a:t>11/16/2015</a:t>
             </a:fld>
             <a:endParaRPr lang="en-US" dirty="0"/>
@@ -5438,9 +6361,9 @@
           </p:nvPr>
         </p:nvSpPr>
         <p:spPr>
-          <a:xfrm rot="5400000">
-            <a:off x="8951573" y="3225297"/>
-            <a:ext cx="3859795" cy="304801"/>
+          <a:xfrm>
+            <a:off x="10437812" y="3233921"/>
+            <a:ext cx="1562101" cy="493123"/>
           </a:xfrm>
           <a:prstGeom prst="rect">
             <a:avLst/>
@@ -5450,10 +6373,11 @@
           <a:bodyPr vert="horz" lIns="91440" tIns="45720" rIns="91440" bIns="45720" rtlCol="0" anchor="b"/>
           <a:lstStyle>
             <a:lvl1pPr algn="l">
-              <a:defRPr sz="1100" b="0" i="0">
+              <a:defRPr sz="2000" b="0" i="0">
                 <a:solidFill>
-                  <a:schemeClr val="tx1">
-                    <a:tint val="75000"/>
+                  <a:schemeClr val="accent4">
+                    <a:lumMod val="20000"/>
+                    <a:lumOff val="80000"/>
                     <a:alpha val="60000"/>
                   </a:schemeClr>
                 </a:solidFill>
@@ -5461,6 +6385,10 @@
             </a:lvl1pPr>
           </a:lstStyle>
           <a:p>
+            <a:r>
+              <a:rPr lang="en-US" dirty="0" smtClean="0"/>
+              <a:t>Team Lich</a:t>
+            </a:r>
             <a:endParaRPr lang="en-US" dirty="0"/>
           </a:p>
         </p:txBody>
@@ -5499,7 +6427,7 @@
           </a:lstStyle>
           <a:p>
             <a:fld id="{D57F1E4F-1CFF-5643-939E-02111984F565}" type="slidenum">
-              <a:rPr lang="en-US" dirty="0"/>
+              <a:rPr lang="en-US" smtClean="0"/>
               <a:t>‹#›</a:t>
             </a:fld>
             <a:endParaRPr lang="en-US" dirty="0"/>
@@ -5507,28 +6435,40 @@
         </p:txBody>
       </p:sp>
     </p:spTree>
+    <p:extLst>
+      <p:ext uri="{BB962C8B-B14F-4D97-AF65-F5344CB8AC3E}">
+        <p14:creationId xmlns:p14="http://schemas.microsoft.com/office/powerpoint/2010/main" val="1526004381"/>
+      </p:ext>
+    </p:extLst>
   </p:cSld>
   <p:clrMap bg1="dk1" tx1="lt1" bg2="dk2" tx2="lt2" accent1="accent1" accent2="accent2" accent3="accent3" accent4="accent4" accent5="accent5" accent6="accent6" hlink="hlink" folHlink="folHlink"/>
   <p:sldLayoutIdLst>
-    <p:sldLayoutId id="2147483649" r:id="rId1"/>
-    <p:sldLayoutId id="2147483650" r:id="rId2"/>
-    <p:sldLayoutId id="2147483651" r:id="rId3"/>
-    <p:sldLayoutId id="2147483652" r:id="rId4"/>
-    <p:sldLayoutId id="2147483653" r:id="rId5"/>
-    <p:sldLayoutId id="2147483654" r:id="rId6"/>
-    <p:sldLayoutId id="2147483655" r:id="rId7"/>
-    <p:sldLayoutId id="2147483656" r:id="rId8"/>
-    <p:sldLayoutId id="2147483668" r:id="rId9"/>
-    <p:sldLayoutId id="2147483667" r:id="rId10"/>
-    <p:sldLayoutId id="2147483661" r:id="rId11"/>
-    <p:sldLayoutId id="2147483664" r:id="rId12"/>
-    <p:sldLayoutId id="2147483662" r:id="rId13"/>
-    <p:sldLayoutId id="2147483669" r:id="rId14"/>
-    <p:sldLayoutId id="2147483670" r:id="rId15"/>
-    <p:sldLayoutId id="2147483658" r:id="rId16"/>
-    <p:sldLayoutId id="2147483659" r:id="rId17"/>
+    <p:sldLayoutId id="2147483690" r:id="rId1"/>
+    <p:sldLayoutId id="2147483691" r:id="rId2"/>
+    <p:sldLayoutId id="2147483692" r:id="rId3"/>
+    <p:sldLayoutId id="2147483693" r:id="rId4"/>
+    <p:sldLayoutId id="2147483694" r:id="rId5"/>
+    <p:sldLayoutId id="2147483695" r:id="rId6"/>
+    <p:sldLayoutId id="2147483696" r:id="rId7"/>
+    <p:sldLayoutId id="2147483697" r:id="rId8"/>
+    <p:sldLayoutId id="2147483698" r:id="rId9"/>
+    <p:sldLayoutId id="2147483699" r:id="rId10"/>
+    <p:sldLayoutId id="2147483700" r:id="rId11"/>
+    <p:sldLayoutId id="2147483701" r:id="rId12"/>
+    <p:sldLayoutId id="2147483702" r:id="rId13"/>
+    <p:sldLayoutId id="2147483703" r:id="rId14"/>
+    <p:sldLayoutId id="2147483704" r:id="rId15"/>
+    <p:sldLayoutId id="2147483705" r:id="rId16"/>
+    <p:sldLayoutId id="2147483706" r:id="rId17"/>
   </p:sldLayoutIdLst>
-  <p:hf sldNum="0" hdr="0" ftr="0" dt="0"/>
+  <p:timing>
+    <p:tnLst>
+      <p:par>
+        <p:cTn id="1" dur="indefinite" restart="never" nodeType="tmRoot"/>
+      </p:par>
+    </p:tnLst>
+  </p:timing>
+  <p:hf hdr="0" dt="0"/>
   <p:txStyles>
     <p:titleStyle>
       <a:lvl1pPr algn="l" defTabSz="457200" rtl="0" eaLnBrk="1" latinLnBrk="0" hangingPunct="1">
@@ -5956,23 +6896,207 @@
           </a:p>
         </p:txBody>
       </p:sp>
+      <p:sp>
+        <p:nvSpPr>
+          <p:cNvPr id="4" name="Контейнер за номер на слайда 3"/>
+          <p:cNvSpPr>
+            <a:spLocks noGrp="1"/>
+          </p:cNvSpPr>
+          <p:nvPr>
+            <p:ph type="sldNum" sz="quarter" idx="12"/>
+          </p:nvPr>
+        </p:nvSpPr>
+        <p:spPr/>
+        <p:txBody>
+          <a:bodyPr/>
+          <a:lstStyle/>
+          <a:p>
+            <a:fld id="{D57F1E4F-1CFF-5643-939E-02111984F565}" type="slidenum">
+              <a:rPr lang="en-US" smtClean="0"/>
+              <a:t>1</a:t>
+            </a:fld>
+            <a:endParaRPr lang="en-US" dirty="0"/>
+          </a:p>
+        </p:txBody>
+      </p:sp>
+      <p:sp>
+        <p:nvSpPr>
+          <p:cNvPr id="5" name="Контейнер за долния колонтитул 4"/>
+          <p:cNvSpPr>
+            <a:spLocks noGrp="1"/>
+          </p:cNvSpPr>
+          <p:nvPr>
+            <p:ph type="ftr" sz="quarter" idx="11"/>
+          </p:nvPr>
+        </p:nvSpPr>
+        <p:spPr/>
+        <p:txBody>
+          <a:bodyPr/>
+          <a:lstStyle/>
+          <a:p>
+            <a:r>
+              <a:rPr lang="en-US" smtClean="0"/>
+              <a:t>Team Lich</a:t>
+            </a:r>
+            <a:endParaRPr lang="en-US" dirty="0"/>
+          </a:p>
+        </p:txBody>
+      </p:sp>
     </p:spTree>
     <p:extLst>
       <p:ext uri="{BB962C8B-B14F-4D97-AF65-F5344CB8AC3E}">
-        <p14:creationId xmlns:p14="http://schemas.microsoft.com/office/powerpoint/2010/main" val="739921857"/>
+        <p14:creationId xmlns:p14="http://schemas.microsoft.com/office/powerpoint/2010/main" val="3184497229"/>
       </p:ext>
     </p:extLst>
   </p:cSld>
   <p:clrMapOvr>
     <a:masterClrMapping/>
   </p:clrMapOvr>
+  <p:timing>
+    <p:tnLst>
+      <p:par>
+        <p:cTn id="1" dur="indefinite" restart="never" nodeType="tmRoot"/>
+      </p:par>
+    </p:tnLst>
+  </p:timing>
+</p:sld>
+</file>
+
+<file path=ppt/slides/slide2.xml><?xml version="1.0" encoding="utf-8"?>
+<p:sld xmlns:a="http://schemas.openxmlformats.org/drawingml/2006/main" xmlns:r="http://schemas.openxmlformats.org/officeDocument/2006/relationships" xmlns:p="http://schemas.openxmlformats.org/presentationml/2006/main">
+  <p:cSld>
+    <p:spTree>
+      <p:nvGrpSpPr>
+        <p:cNvPr id="1" name=""/>
+        <p:cNvGrpSpPr/>
+        <p:nvPr/>
+      </p:nvGrpSpPr>
+      <p:grpSpPr>
+        <a:xfrm>
+          <a:off x="0" y="0"/>
+          <a:ext cx="0" cy="0"/>
+          <a:chOff x="0" y="0"/>
+          <a:chExt cx="0" cy="0"/>
+        </a:xfrm>
+      </p:grpSpPr>
+      <p:sp>
+        <p:nvSpPr>
+          <p:cNvPr id="2" name="Заглавие 1"/>
+          <p:cNvSpPr>
+            <a:spLocks noGrp="1"/>
+          </p:cNvSpPr>
+          <p:nvPr>
+            <p:ph type="title"/>
+          </p:nvPr>
+        </p:nvSpPr>
+        <p:spPr>
+          <a:xfrm>
+            <a:off x="646111" y="452718"/>
+            <a:ext cx="9404723" cy="1400530"/>
+          </a:xfrm>
+        </p:spPr>
+        <p:txBody>
+          <a:bodyPr/>
+          <a:lstStyle/>
+          <a:p>
+            <a:endParaRPr lang="bg-BG"/>
+          </a:p>
+        </p:txBody>
+      </p:sp>
+      <p:sp>
+        <p:nvSpPr>
+          <p:cNvPr id="3" name="Контейнер за съдържание 2"/>
+          <p:cNvSpPr>
+            <a:spLocks noGrp="1"/>
+          </p:cNvSpPr>
+          <p:nvPr>
+            <p:ph idx="1"/>
+          </p:nvPr>
+        </p:nvSpPr>
+        <p:spPr/>
+        <p:txBody>
+          <a:bodyPr/>
+          <a:lstStyle/>
+          <a:p>
+            <a:endParaRPr lang="bg-BG"/>
+          </a:p>
+        </p:txBody>
+      </p:sp>
+      <p:sp>
+        <p:nvSpPr>
+          <p:cNvPr id="4" name="Контейнер за номер на слайда 3"/>
+          <p:cNvSpPr>
+            <a:spLocks noGrp="1"/>
+          </p:cNvSpPr>
+          <p:nvPr>
+            <p:ph type="sldNum" sz="quarter" idx="12"/>
+          </p:nvPr>
+        </p:nvSpPr>
+        <p:spPr>
+          <a:xfrm>
+            <a:off x="10352540" y="295729"/>
+            <a:ext cx="838199" cy="767687"/>
+          </a:xfrm>
+        </p:spPr>
+        <p:txBody>
+          <a:bodyPr/>
+          <a:lstStyle/>
+          <a:p>
+            <a:fld id="{D57F1E4F-1CFF-5643-939E-02111984F565}" type="slidenum">
+              <a:rPr lang="en-US" smtClean="0"/>
+              <a:t>2</a:t>
+            </a:fld>
+            <a:endParaRPr lang="en-US" dirty="0"/>
+          </a:p>
+        </p:txBody>
+      </p:sp>
+      <p:sp>
+        <p:nvSpPr>
+          <p:cNvPr id="5" name="Контейнер за долния колонтитул 4"/>
+          <p:cNvSpPr>
+            <a:spLocks noGrp="1"/>
+          </p:cNvSpPr>
+          <p:nvPr>
+            <p:ph type="ftr" sz="quarter" idx="11"/>
+          </p:nvPr>
+        </p:nvSpPr>
+        <p:spPr/>
+        <p:txBody>
+          <a:bodyPr/>
+          <a:lstStyle/>
+          <a:p>
+            <a:r>
+              <a:rPr lang="en-US" smtClean="0"/>
+              <a:t>Team Lich</a:t>
+            </a:r>
+            <a:endParaRPr lang="en-US" dirty="0"/>
+          </a:p>
+        </p:txBody>
+      </p:sp>
+    </p:spTree>
+    <p:extLst>
+      <p:ext uri="{BB962C8B-B14F-4D97-AF65-F5344CB8AC3E}">
+        <p14:creationId xmlns:p14="http://schemas.microsoft.com/office/powerpoint/2010/main" val="3221823130"/>
+      </p:ext>
+    </p:extLst>
+  </p:cSld>
+  <p:clrMapOvr>
+    <a:masterClrMapping/>
+  </p:clrMapOvr>
+  <p:timing>
+    <p:tnLst>
+      <p:par>
+        <p:cTn id="1" dur="indefinite" restart="never" nodeType="tmRoot"/>
+      </p:par>
+    </p:tnLst>
+  </p:timing>
 </p:sld>
 </file>
 
 <file path=ppt/theme/theme1.xml><?xml version="1.0" encoding="utf-8"?>
 <a:theme xmlns:a="http://schemas.openxmlformats.org/drawingml/2006/main" name="Йон">
   <a:themeElements>
-    <a:clrScheme name="Ion">
+    <a:clrScheme name="Йон">
       <a:dk1>
         <a:sysClr val="windowText" lastClr="000000"/>
       </a:dk1>
@@ -6010,7 +7134,7 @@
         <a:srgbClr val="BDE0FB"/>
       </a:folHlink>
     </a:clrScheme>
-    <a:fontScheme name="Ion">
+    <a:fontScheme name="Йон">
       <a:majorFont>
         <a:latin typeface="Century Gothic" panose="020B0502020202020204"/>
         <a:ea typeface=""/>
@@ -6082,7 +7206,7 @@
         <a:font script="Geor" typeface="Sylfaen"/>
       </a:minorFont>
     </a:fontScheme>
-    <a:fmtScheme name="Ion">
+    <a:fmtScheme name="Йон">
       <a:fillStyleLst>
         <a:solidFill>
           <a:schemeClr val="phClr"/>
@@ -6232,4 +7356,526 @@
     </a:ext>
   </a:extLst>
 </a:theme>
+</file>
+
+<file path=ppt/theme/theme2.xml><?xml version="1.0" encoding="utf-8"?>
+<a:theme xmlns:a="http://schemas.openxmlformats.org/drawingml/2006/main" name="Office тема">
+  <a:themeElements>
+    <a:clrScheme name="Оffice">
+      <a:dk1>
+        <a:sysClr val="windowText" lastClr="000000"/>
+      </a:dk1>
+      <a:lt1>
+        <a:sysClr val="window" lastClr="FFFFFF"/>
+      </a:lt1>
+      <a:dk2>
+        <a:srgbClr val="44546A"/>
+      </a:dk2>
+      <a:lt2>
+        <a:srgbClr val="E7E6E6"/>
+      </a:lt2>
+      <a:accent1>
+        <a:srgbClr val="5B9BD5"/>
+      </a:accent1>
+      <a:accent2>
+        <a:srgbClr val="ED7D31"/>
+      </a:accent2>
+      <a:accent3>
+        <a:srgbClr val="A5A5A5"/>
+      </a:accent3>
+      <a:accent4>
+        <a:srgbClr val="FFC000"/>
+      </a:accent4>
+      <a:accent5>
+        <a:srgbClr val="4472C4"/>
+      </a:accent5>
+      <a:accent6>
+        <a:srgbClr val="70AD47"/>
+      </a:accent6>
+      <a:hlink>
+        <a:srgbClr val="0563C1"/>
+      </a:hlink>
+      <a:folHlink>
+        <a:srgbClr val="954F72"/>
+      </a:folHlink>
+    </a:clrScheme>
+    <a:fontScheme name="Оffice">
+      <a:majorFont>
+        <a:latin typeface="Calibri Light" panose="020F0302020204030204"/>
+        <a:ea typeface=""/>
+        <a:cs typeface=""/>
+        <a:font script="Jpan" typeface="ＭＳ Ｐゴシック"/>
+        <a:font script="Hang" typeface="맑은 고딕"/>
+        <a:font script="Hans" typeface="宋体"/>
+        <a:font script="Hant" typeface="新細明體"/>
+        <a:font script="Arab" typeface="Times New Roman"/>
+        <a:font script="Hebr" typeface="Times New Roman"/>
+        <a:font script="Thai" typeface="Angsana New"/>
+        <a:font script="Ethi" typeface="Nyala"/>
+        <a:font script="Beng" typeface="Vrinda"/>
+        <a:font script="Gujr" typeface="Shruti"/>
+        <a:font script="Khmr" typeface="MoolBoran"/>
+        <a:font script="Knda" typeface="Tunga"/>
+        <a:font script="Guru" typeface="Raavi"/>
+        <a:font script="Cans" typeface="Euphemia"/>
+        <a:font script="Cher" typeface="Plantagenet Cherokee"/>
+        <a:font script="Yiii" typeface="Microsoft Yi Baiti"/>
+        <a:font script="Tibt" typeface="Microsoft Himalaya"/>
+        <a:font script="Thaa" typeface="MV Boli"/>
+        <a:font script="Deva" typeface="Mangal"/>
+        <a:font script="Telu" typeface="Gautami"/>
+        <a:font script="Taml" typeface="Latha"/>
+        <a:font script="Syrc" typeface="Estrangelo Edessa"/>
+        <a:font script="Orya" typeface="Kalinga"/>
+        <a:font script="Mlym" typeface="Kartika"/>
+        <a:font script="Laoo" typeface="DokChampa"/>
+        <a:font script="Sinh" typeface="Iskoola Pota"/>
+        <a:font script="Mong" typeface="Mongolian Baiti"/>
+        <a:font script="Viet" typeface="Times New Roman"/>
+        <a:font script="Uigh" typeface="Microsoft Uighur"/>
+        <a:font script="Geor" typeface="Sylfaen"/>
+      </a:majorFont>
+      <a:minorFont>
+        <a:latin typeface="Calibri" panose="020F0502020204030204"/>
+        <a:ea typeface=""/>
+        <a:cs typeface=""/>
+        <a:font script="Jpan" typeface="ＭＳ Ｐゴシック"/>
+        <a:font script="Hang" typeface="맑은 고딕"/>
+        <a:font script="Hans" typeface="宋体"/>
+        <a:font script="Hant" typeface="新細明體"/>
+        <a:font script="Arab" typeface="Arial"/>
+        <a:font script="Hebr" typeface="Arial"/>
+        <a:font script="Thai" typeface="Cordia New"/>
+        <a:font script="Ethi" typeface="Nyala"/>
+        <a:font script="Beng" typeface="Vrinda"/>
+        <a:font script="Gujr" typeface="Shruti"/>
+        <a:font script="Khmr" typeface="DaunPenh"/>
+        <a:font script="Knda" typeface="Tunga"/>
+        <a:font script="Guru" typeface="Raavi"/>
+        <a:font script="Cans" typeface="Euphemia"/>
+        <a:font script="Cher" typeface="Plantagenet Cherokee"/>
+        <a:font script="Yiii" typeface="Microsoft Yi Baiti"/>
+        <a:font script="Tibt" typeface="Microsoft Himalaya"/>
+        <a:font script="Thaa" typeface="MV Boli"/>
+        <a:font script="Deva" typeface="Mangal"/>
+        <a:font script="Telu" typeface="Gautami"/>
+        <a:font script="Taml" typeface="Latha"/>
+        <a:font script="Syrc" typeface="Estrangelo Edessa"/>
+        <a:font script="Orya" typeface="Kalinga"/>
+        <a:font script="Mlym" typeface="Kartika"/>
+        <a:font script="Laoo" typeface="DokChampa"/>
+        <a:font script="Sinh" typeface="Iskoola Pota"/>
+        <a:font script="Mong" typeface="Mongolian Baiti"/>
+        <a:font script="Viet" typeface="Arial"/>
+        <a:font script="Uigh" typeface="Microsoft Uighur"/>
+        <a:font script="Geor" typeface="Sylfaen"/>
+      </a:minorFont>
+    </a:fontScheme>
+    <a:fmtScheme name="Оffice">
+      <a:fillStyleLst>
+        <a:solidFill>
+          <a:schemeClr val="phClr"/>
+        </a:solidFill>
+        <a:gradFill rotWithShape="1">
+          <a:gsLst>
+            <a:gs pos="0">
+              <a:schemeClr val="phClr">
+                <a:lumMod val="110000"/>
+                <a:satMod val="105000"/>
+                <a:tint val="67000"/>
+              </a:schemeClr>
+            </a:gs>
+            <a:gs pos="50000">
+              <a:schemeClr val="phClr">
+                <a:lumMod val="105000"/>
+                <a:satMod val="103000"/>
+                <a:tint val="73000"/>
+              </a:schemeClr>
+            </a:gs>
+            <a:gs pos="100000">
+              <a:schemeClr val="phClr">
+                <a:lumMod val="105000"/>
+                <a:satMod val="109000"/>
+                <a:tint val="81000"/>
+              </a:schemeClr>
+            </a:gs>
+          </a:gsLst>
+          <a:lin ang="5400000" scaled="0"/>
+        </a:gradFill>
+        <a:gradFill rotWithShape="1">
+          <a:gsLst>
+            <a:gs pos="0">
+              <a:schemeClr val="phClr">
+                <a:satMod val="103000"/>
+                <a:lumMod val="102000"/>
+                <a:tint val="94000"/>
+              </a:schemeClr>
+            </a:gs>
+            <a:gs pos="50000">
+              <a:schemeClr val="phClr">
+                <a:satMod val="110000"/>
+                <a:lumMod val="100000"/>
+                <a:shade val="100000"/>
+              </a:schemeClr>
+            </a:gs>
+            <a:gs pos="100000">
+              <a:schemeClr val="phClr">
+                <a:lumMod val="99000"/>
+                <a:satMod val="120000"/>
+                <a:shade val="78000"/>
+              </a:schemeClr>
+            </a:gs>
+          </a:gsLst>
+          <a:lin ang="5400000" scaled="0"/>
+        </a:gradFill>
+      </a:fillStyleLst>
+      <a:lnStyleLst>
+        <a:ln w="6350" cap="flat" cmpd="sng" algn="ctr">
+          <a:solidFill>
+            <a:schemeClr val="phClr"/>
+          </a:solidFill>
+          <a:prstDash val="solid"/>
+          <a:miter lim="800000"/>
+        </a:ln>
+        <a:ln w="12700" cap="flat" cmpd="sng" algn="ctr">
+          <a:solidFill>
+            <a:schemeClr val="phClr"/>
+          </a:solidFill>
+          <a:prstDash val="solid"/>
+          <a:miter lim="800000"/>
+        </a:ln>
+        <a:ln w="19050" cap="flat" cmpd="sng" algn="ctr">
+          <a:solidFill>
+            <a:schemeClr val="phClr"/>
+          </a:solidFill>
+          <a:prstDash val="solid"/>
+          <a:miter lim="800000"/>
+        </a:ln>
+      </a:lnStyleLst>
+      <a:effectStyleLst>
+        <a:effectStyle>
+          <a:effectLst/>
+        </a:effectStyle>
+        <a:effectStyle>
+          <a:effectLst/>
+        </a:effectStyle>
+        <a:effectStyle>
+          <a:effectLst>
+            <a:outerShdw blurRad="57150" dist="19050" dir="5400000" algn="ctr" rotWithShape="0">
+              <a:srgbClr val="000000">
+                <a:alpha val="63000"/>
+              </a:srgbClr>
+            </a:outerShdw>
+          </a:effectLst>
+        </a:effectStyle>
+      </a:effectStyleLst>
+      <a:bgFillStyleLst>
+        <a:solidFill>
+          <a:schemeClr val="phClr"/>
+        </a:solidFill>
+        <a:solidFill>
+          <a:schemeClr val="phClr">
+            <a:tint val="95000"/>
+            <a:satMod val="170000"/>
+          </a:schemeClr>
+        </a:solidFill>
+        <a:gradFill rotWithShape="1">
+          <a:gsLst>
+            <a:gs pos="0">
+              <a:schemeClr val="phClr">
+                <a:tint val="93000"/>
+                <a:satMod val="150000"/>
+                <a:shade val="98000"/>
+                <a:lumMod val="102000"/>
+              </a:schemeClr>
+            </a:gs>
+            <a:gs pos="50000">
+              <a:schemeClr val="phClr">
+                <a:tint val="98000"/>
+                <a:satMod val="130000"/>
+                <a:shade val="90000"/>
+                <a:lumMod val="103000"/>
+              </a:schemeClr>
+            </a:gs>
+            <a:gs pos="100000">
+              <a:schemeClr val="phClr">
+                <a:shade val="63000"/>
+                <a:satMod val="120000"/>
+              </a:schemeClr>
+            </a:gs>
+          </a:gsLst>
+          <a:lin ang="5400000" scaled="0"/>
+        </a:gradFill>
+      </a:bgFillStyleLst>
+    </a:fmtScheme>
+  </a:themeElements>
+  <a:objectDefaults/>
+  <a:extraClrSchemeLst/>
+  <a:extLst>
+    <a:ext uri="{05A4C25C-085E-4340-85A3-A5531E510DB2}">
+      <thm15:themeFamily xmlns:thm15="http://schemas.microsoft.com/office/thememl/2012/main" name="Office Theme" id="{62F939B6-93AF-4DB8-9C6B-D6C7DFDC589F}" vid="{4A3C46E8-61CC-4603-A589-7422A47A8E4A}"/>
+    </a:ext>
+  </a:extLst>
+</a:theme>
+</file>
+
+<file path=ppt/theme/theme3.xml><?xml version="1.0" encoding="utf-8"?>
+<a:theme xmlns:a="http://schemas.openxmlformats.org/drawingml/2006/main" name="Office тема">
+  <a:themeElements>
+    <a:clrScheme name="Оffice">
+      <a:dk1>
+        <a:sysClr val="windowText" lastClr="000000"/>
+      </a:dk1>
+      <a:lt1>
+        <a:sysClr val="window" lastClr="FFFFFF"/>
+      </a:lt1>
+      <a:dk2>
+        <a:srgbClr val="44546A"/>
+      </a:dk2>
+      <a:lt2>
+        <a:srgbClr val="E7E6E6"/>
+      </a:lt2>
+      <a:accent1>
+        <a:srgbClr val="5B9BD5"/>
+      </a:accent1>
+      <a:accent2>
+        <a:srgbClr val="ED7D31"/>
+      </a:accent2>
+      <a:accent3>
+        <a:srgbClr val="A5A5A5"/>
+      </a:accent3>
+      <a:accent4>
+        <a:srgbClr val="FFC000"/>
+      </a:accent4>
+      <a:accent5>
+        <a:srgbClr val="4472C4"/>
+      </a:accent5>
+      <a:accent6>
+        <a:srgbClr val="70AD47"/>
+      </a:accent6>
+      <a:hlink>
+        <a:srgbClr val="0563C1"/>
+      </a:hlink>
+      <a:folHlink>
+        <a:srgbClr val="954F72"/>
+      </a:folHlink>
+    </a:clrScheme>
+    <a:fontScheme name="Оffice">
+      <a:majorFont>
+        <a:latin typeface="Calibri Light" panose="020F0302020204030204"/>
+        <a:ea typeface=""/>
+        <a:cs typeface=""/>
+        <a:font script="Jpan" typeface="ＭＳ Ｐゴシック"/>
+        <a:font script="Hang" typeface="맑은 고딕"/>
+        <a:font script="Hans" typeface="宋体"/>
+        <a:font script="Hant" typeface="新細明體"/>
+        <a:font script="Arab" typeface="Times New Roman"/>
+        <a:font script="Hebr" typeface="Times New Roman"/>
+        <a:font script="Thai" typeface="Angsana New"/>
+        <a:font script="Ethi" typeface="Nyala"/>
+        <a:font script="Beng" typeface="Vrinda"/>
+        <a:font script="Gujr" typeface="Shruti"/>
+        <a:font script="Khmr" typeface="MoolBoran"/>
+        <a:font script="Knda" typeface="Tunga"/>
+        <a:font script="Guru" typeface="Raavi"/>
+        <a:font script="Cans" typeface="Euphemia"/>
+        <a:font script="Cher" typeface="Plantagenet Cherokee"/>
+        <a:font script="Yiii" typeface="Microsoft Yi Baiti"/>
+        <a:font script="Tibt" typeface="Microsoft Himalaya"/>
+        <a:font script="Thaa" typeface="MV Boli"/>
+        <a:font script="Deva" typeface="Mangal"/>
+        <a:font script="Telu" typeface="Gautami"/>
+        <a:font script="Taml" typeface="Latha"/>
+        <a:font script="Syrc" typeface="Estrangelo Edessa"/>
+        <a:font script="Orya" typeface="Kalinga"/>
+        <a:font script="Mlym" typeface="Kartika"/>
+        <a:font script="Laoo" typeface="DokChampa"/>
+        <a:font script="Sinh" typeface="Iskoola Pota"/>
+        <a:font script="Mong" typeface="Mongolian Baiti"/>
+        <a:font script="Viet" typeface="Times New Roman"/>
+        <a:font script="Uigh" typeface="Microsoft Uighur"/>
+        <a:font script="Geor" typeface="Sylfaen"/>
+      </a:majorFont>
+      <a:minorFont>
+        <a:latin typeface="Calibri" panose="020F0502020204030204"/>
+        <a:ea typeface=""/>
+        <a:cs typeface=""/>
+        <a:font script="Jpan" typeface="ＭＳ Ｐゴシック"/>
+        <a:font script="Hang" typeface="맑은 고딕"/>
+        <a:font script="Hans" typeface="宋体"/>
+        <a:font script="Hant" typeface="新細明體"/>
+        <a:font script="Arab" typeface="Arial"/>
+        <a:font script="Hebr" typeface="Arial"/>
+        <a:font script="Thai" typeface="Cordia New"/>
+        <a:font script="Ethi" typeface="Nyala"/>
+        <a:font script="Beng" typeface="Vrinda"/>
+        <a:font script="Gujr" typeface="Shruti"/>
+        <a:font script="Khmr" typeface="DaunPenh"/>
+        <a:font script="Knda" typeface="Tunga"/>
+        <a:font script="Guru" typeface="Raavi"/>
+        <a:font script="Cans" typeface="Euphemia"/>
+        <a:font script="Cher" typeface="Plantagenet Cherokee"/>
+        <a:font script="Yiii" typeface="Microsoft Yi Baiti"/>
+        <a:font script="Tibt" typeface="Microsoft Himalaya"/>
+        <a:font script="Thaa" typeface="MV Boli"/>
+        <a:font script="Deva" typeface="Mangal"/>
+        <a:font script="Telu" typeface="Gautami"/>
+        <a:font script="Taml" typeface="Latha"/>
+        <a:font script="Syrc" typeface="Estrangelo Edessa"/>
+        <a:font script="Orya" typeface="Kalinga"/>
+        <a:font script="Mlym" typeface="Kartika"/>
+        <a:font script="Laoo" typeface="DokChampa"/>
+        <a:font script="Sinh" typeface="Iskoola Pota"/>
+        <a:font script="Mong" typeface="Mongolian Baiti"/>
+        <a:font script="Viet" typeface="Arial"/>
+        <a:font script="Uigh" typeface="Microsoft Uighur"/>
+        <a:font script="Geor" typeface="Sylfaen"/>
+      </a:minorFont>
+    </a:fontScheme>
+    <a:fmtScheme name="Оffice">
+      <a:fillStyleLst>
+        <a:solidFill>
+          <a:schemeClr val="phClr"/>
+        </a:solidFill>
+        <a:gradFill rotWithShape="1">
+          <a:gsLst>
+            <a:gs pos="0">
+              <a:schemeClr val="phClr">
+                <a:lumMod val="110000"/>
+                <a:satMod val="105000"/>
+                <a:tint val="67000"/>
+              </a:schemeClr>
+            </a:gs>
+            <a:gs pos="50000">
+              <a:schemeClr val="phClr">
+                <a:lumMod val="105000"/>
+                <a:satMod val="103000"/>
+                <a:tint val="73000"/>
+              </a:schemeClr>
+            </a:gs>
+            <a:gs pos="100000">
+              <a:schemeClr val="phClr">
+                <a:lumMod val="105000"/>
+                <a:satMod val="109000"/>
+                <a:tint val="81000"/>
+              </a:schemeClr>
+            </a:gs>
+          </a:gsLst>
+          <a:lin ang="5400000" scaled="0"/>
+        </a:gradFill>
+        <a:gradFill rotWithShape="1">
+          <a:gsLst>
+            <a:gs pos="0">
+              <a:schemeClr val="phClr">
+                <a:satMod val="103000"/>
+                <a:lumMod val="102000"/>
+                <a:tint val="94000"/>
+              </a:schemeClr>
+            </a:gs>
+            <a:gs pos="50000">
+              <a:schemeClr val="phClr">
+                <a:satMod val="110000"/>
+                <a:lumMod val="100000"/>
+                <a:shade val="100000"/>
+              </a:schemeClr>
+            </a:gs>
+            <a:gs pos="100000">
+              <a:schemeClr val="phClr">
+                <a:lumMod val="99000"/>
+                <a:satMod val="120000"/>
+                <a:shade val="78000"/>
+              </a:schemeClr>
+            </a:gs>
+          </a:gsLst>
+          <a:lin ang="5400000" scaled="0"/>
+        </a:gradFill>
+      </a:fillStyleLst>
+      <a:lnStyleLst>
+        <a:ln w="6350" cap="flat" cmpd="sng" algn="ctr">
+          <a:solidFill>
+            <a:schemeClr val="phClr"/>
+          </a:solidFill>
+          <a:prstDash val="solid"/>
+          <a:miter lim="800000"/>
+        </a:ln>
+        <a:ln w="12700" cap="flat" cmpd="sng" algn="ctr">
+          <a:solidFill>
+            <a:schemeClr val="phClr"/>
+          </a:solidFill>
+          <a:prstDash val="solid"/>
+          <a:miter lim="800000"/>
+        </a:ln>
+        <a:ln w="19050" cap="flat" cmpd="sng" algn="ctr">
+          <a:solidFill>
+            <a:schemeClr val="phClr"/>
+          </a:solidFill>
+          <a:prstDash val="solid"/>
+          <a:miter lim="800000"/>
+        </a:ln>
+      </a:lnStyleLst>
+      <a:effectStyleLst>
+        <a:effectStyle>
+          <a:effectLst/>
+        </a:effectStyle>
+        <a:effectStyle>
+          <a:effectLst/>
+        </a:effectStyle>
+        <a:effectStyle>
+          <a:effectLst>
+            <a:outerShdw blurRad="57150" dist="19050" dir="5400000" algn="ctr" rotWithShape="0">
+              <a:srgbClr val="000000">
+                <a:alpha val="63000"/>
+              </a:srgbClr>
+            </a:outerShdw>
+          </a:effectLst>
+        </a:effectStyle>
+      </a:effectStyleLst>
+      <a:bgFillStyleLst>
+        <a:solidFill>
+          <a:schemeClr val="phClr"/>
+        </a:solidFill>
+        <a:solidFill>
+          <a:schemeClr val="phClr">
+            <a:tint val="95000"/>
+            <a:satMod val="170000"/>
+          </a:schemeClr>
+        </a:solidFill>
+        <a:gradFill rotWithShape="1">
+          <a:gsLst>
+            <a:gs pos="0">
+              <a:schemeClr val="phClr">
+                <a:tint val="93000"/>
+                <a:satMod val="150000"/>
+                <a:shade val="98000"/>
+                <a:lumMod val="102000"/>
+              </a:schemeClr>
+            </a:gs>
+            <a:gs pos="50000">
+              <a:schemeClr val="phClr">
+                <a:tint val="98000"/>
+                <a:satMod val="130000"/>
+                <a:shade val="90000"/>
+                <a:lumMod val="103000"/>
+              </a:schemeClr>
+            </a:gs>
+            <a:gs pos="100000">
+              <a:schemeClr val="phClr">
+                <a:shade val="63000"/>
+                <a:satMod val="120000"/>
+              </a:schemeClr>
+            </a:gs>
+          </a:gsLst>
+          <a:lin ang="5400000" scaled="0"/>
+        </a:gradFill>
+      </a:bgFillStyleLst>
+    </a:fmtScheme>
+  </a:themeElements>
+  <a:objectDefaults/>
+  <a:extraClrSchemeLst/>
+  <a:extLst>
+    <a:ext uri="{05A4C25C-085E-4340-85A3-A5531E510DB2}">
+      <thm15:themeFamily xmlns:thm15="http://schemas.microsoft.com/office/thememl/2012/main" name="Office Theme" id="{62F939B6-93AF-4DB8-9C6B-D6C7DFDC589F}" vid="{4A3C46E8-61CC-4603-A589-7422A47A8E4A}"/>
+    </a:ext>
+  </a:extLst>
+</a:theme>
 </file>
</xml_diff>

<commit_message>
Changed the team font to be creepier
</commit_message>
<xml_diff>
--- a/Template.pptx
+++ b/Template.pptx
@@ -11,8 +11,8 @@
     <p:handoutMasterId r:id="rId5"/>
   </p:handoutMasterIdLst>
   <p:sldIdLst>
-    <p:sldId id="260" r:id="rId2"/>
-    <p:sldId id="261" r:id="rId3"/>
+    <p:sldId id="256" r:id="rId2"/>
+    <p:sldId id="257" r:id="rId3"/>
   </p:sldIdLst>
   <p:sldSz cx="12192000" cy="6858000"/>
   <p:notesSz cx="6858000" cy="9144000"/>
@@ -652,90 +652,6 @@
 </p:notesMaster>
 </file>
 
-<file path=ppt/notesSlides/notesSlide1.xml><?xml version="1.0" encoding="utf-8"?>
-<p:notes xmlns:a="http://schemas.openxmlformats.org/drawingml/2006/main" xmlns:r="http://schemas.openxmlformats.org/officeDocument/2006/relationships" xmlns:p="http://schemas.openxmlformats.org/presentationml/2006/main">
-  <p:cSld>
-    <p:spTree>
-      <p:nvGrpSpPr>
-        <p:cNvPr id="1" name=""/>
-        <p:cNvGrpSpPr/>
-        <p:nvPr/>
-      </p:nvGrpSpPr>
-      <p:grpSpPr>
-        <a:xfrm>
-          <a:off x="0" y="0"/>
-          <a:ext cx="0" cy="0"/>
-          <a:chOff x="0" y="0"/>
-          <a:chExt cx="0" cy="0"/>
-        </a:xfrm>
-      </p:grpSpPr>
-      <p:sp>
-        <p:nvSpPr>
-          <p:cNvPr id="2" name="Контейнер за изображение на слайда 1"/>
-          <p:cNvSpPr>
-            <a:spLocks noGrp="1" noRot="1" noChangeAspect="1"/>
-          </p:cNvSpPr>
-          <p:nvPr>
-            <p:ph type="sldImg"/>
-          </p:nvPr>
-        </p:nvSpPr>
-        <p:spPr/>
-      </p:sp>
-      <p:sp>
-        <p:nvSpPr>
-          <p:cNvPr id="3" name="Контейнер за бележки 2"/>
-          <p:cNvSpPr>
-            <a:spLocks noGrp="1"/>
-          </p:cNvSpPr>
-          <p:nvPr>
-            <p:ph type="body" idx="1"/>
-          </p:nvPr>
-        </p:nvSpPr>
-        <p:spPr/>
-        <p:txBody>
-          <a:bodyPr/>
-          <a:lstStyle/>
-          <a:p>
-            <a:endParaRPr lang="bg-BG"/>
-          </a:p>
-        </p:txBody>
-      </p:sp>
-      <p:sp>
-        <p:nvSpPr>
-          <p:cNvPr id="4" name="Контейнер за номер на слайда 3"/>
-          <p:cNvSpPr>
-            <a:spLocks noGrp="1"/>
-          </p:cNvSpPr>
-          <p:nvPr>
-            <p:ph type="sldNum" sz="quarter" idx="10"/>
-          </p:nvPr>
-        </p:nvSpPr>
-        <p:spPr/>
-        <p:txBody>
-          <a:bodyPr/>
-          <a:lstStyle/>
-          <a:p>
-            <a:fld id="{5BC3A489-183F-4129-9595-78D831772470}" type="slidenum">
-              <a:rPr lang="bg-BG" smtClean="0"/>
-              <a:t>1</a:t>
-            </a:fld>
-            <a:endParaRPr lang="bg-BG"/>
-          </a:p>
-        </p:txBody>
-      </p:sp>
-    </p:spTree>
-    <p:extLst>
-      <p:ext uri="{BB962C8B-B14F-4D97-AF65-F5344CB8AC3E}">
-        <p14:creationId xmlns:p14="http://schemas.microsoft.com/office/powerpoint/2010/main" val="1780312354"/>
-      </p:ext>
-    </p:extLst>
-  </p:cSld>
-  <p:clrMapOvr>
-    <a:masterClrMapping/>
-  </p:clrMapOvr>
-</p:notes>
-</file>
-
 <file path=ppt/slideLayouts/slideLayout1.xml><?xml version="1.0" encoding="utf-8"?>
 <p:sldLayout xmlns:a="http://schemas.openxmlformats.org/drawingml/2006/main" xmlns:r="http://schemas.openxmlformats.org/officeDocument/2006/relationships" xmlns:p="http://schemas.openxmlformats.org/presentationml/2006/main" type="title" preserve="1">
   <p:cSld name="Заглавен слайд">
@@ -942,13 +858,21 @@
         <p:spPr/>
         <p:txBody>
           <a:bodyPr/>
-          <a:lstStyle/>
-          <a:p>
-            <a:r>
-              <a:rPr lang="en-US" dirty="0" smtClean="0"/>
+          <a:lstStyle>
+            <a:lvl1pPr>
+              <a:defRPr/>
+            </a:lvl1pPr>
+          </a:lstStyle>
+          <a:p>
+            <a:r>
+              <a:rPr lang="en-US" dirty="0" smtClean="0">
+                <a:latin typeface="Chiller" panose="04020404031007020602" pitchFamily="82" charset="0"/>
+              </a:rPr>
               <a:t>Team Lich</a:t>
             </a:r>
-            <a:endParaRPr lang="en-US" dirty="0"/>
+            <a:endParaRPr lang="en-US" dirty="0">
+              <a:latin typeface="Chiller" panose="04020404031007020602" pitchFamily="82" charset="0"/>
+            </a:endParaRPr>
           </a:p>
         </p:txBody>
       </p:sp>
@@ -1228,13 +1152,21 @@
         <p:spPr/>
         <p:txBody>
           <a:bodyPr/>
-          <a:lstStyle/>
-          <a:p>
-            <a:r>
-              <a:rPr lang="en-US" smtClean="0"/>
+          <a:lstStyle>
+            <a:lvl1pPr>
+              <a:defRPr/>
+            </a:lvl1pPr>
+          </a:lstStyle>
+          <a:p>
+            <a:r>
+              <a:rPr lang="en-US" dirty="0" smtClean="0">
+                <a:latin typeface="Chiller" panose="04020404031007020602" pitchFamily="82" charset="0"/>
+              </a:rPr>
               <a:t>Team Lich</a:t>
             </a:r>
-            <a:endParaRPr lang="en-US" dirty="0"/>
+            <a:endParaRPr lang="en-US" dirty="0">
+              <a:latin typeface="Chiller" panose="04020404031007020602" pitchFamily="82" charset="0"/>
+            </a:endParaRPr>
           </a:p>
         </p:txBody>
       </p:sp>
@@ -1433,13 +1365,21 @@
         <p:spPr/>
         <p:txBody>
           <a:bodyPr/>
-          <a:lstStyle/>
-          <a:p>
-            <a:r>
-              <a:rPr lang="en-US" smtClean="0"/>
+          <a:lstStyle>
+            <a:lvl1pPr>
+              <a:defRPr/>
+            </a:lvl1pPr>
+          </a:lstStyle>
+          <a:p>
+            <a:r>
+              <a:rPr lang="en-US" dirty="0" smtClean="0">
+                <a:latin typeface="Chiller" panose="04020404031007020602" pitchFamily="82" charset="0"/>
+              </a:rPr>
               <a:t>Team Lich</a:t>
             </a:r>
-            <a:endParaRPr lang="en-US" dirty="0"/>
+            <a:endParaRPr lang="en-US" dirty="0">
+              <a:latin typeface="Chiller" panose="04020404031007020602" pitchFamily="82" charset="0"/>
+            </a:endParaRPr>
           </a:p>
         </p:txBody>
       </p:sp>
@@ -1712,13 +1652,21 @@
         <p:spPr/>
         <p:txBody>
           <a:bodyPr/>
-          <a:lstStyle/>
-          <a:p>
-            <a:r>
-              <a:rPr lang="en-US" smtClean="0"/>
+          <a:lstStyle>
+            <a:lvl1pPr>
+              <a:defRPr/>
+            </a:lvl1pPr>
+          </a:lstStyle>
+          <a:p>
+            <a:r>
+              <a:rPr lang="en-US" dirty="0" smtClean="0">
+                <a:latin typeface="Chiller" panose="04020404031007020602" pitchFamily="82" charset="0"/>
+              </a:rPr>
               <a:t>Team Lich</a:t>
             </a:r>
-            <a:endParaRPr lang="en-US" dirty="0"/>
+            <a:endParaRPr lang="en-US" dirty="0">
+              <a:latin typeface="Chiller" panose="04020404031007020602" pitchFamily="82" charset="0"/>
+            </a:endParaRPr>
           </a:p>
         </p:txBody>
       </p:sp>
@@ -2055,13 +2003,21 @@
         <p:spPr/>
         <p:txBody>
           <a:bodyPr/>
-          <a:lstStyle/>
-          <a:p>
-            <a:r>
-              <a:rPr lang="en-US" smtClean="0"/>
+          <a:lstStyle>
+            <a:lvl1pPr>
+              <a:defRPr/>
+            </a:lvl1pPr>
+          </a:lstStyle>
+          <a:p>
+            <a:r>
+              <a:rPr lang="en-US" dirty="0" smtClean="0">
+                <a:latin typeface="Chiller" panose="04020404031007020602" pitchFamily="82" charset="0"/>
+              </a:rPr>
               <a:t>Team Lich</a:t>
             </a:r>
-            <a:endParaRPr lang="en-US" dirty="0"/>
+            <a:endParaRPr lang="en-US" dirty="0">
+              <a:latin typeface="Chiller" panose="04020404031007020602" pitchFamily="82" charset="0"/>
+            </a:endParaRPr>
           </a:p>
         </p:txBody>
       </p:sp>
@@ -2676,13 +2632,21 @@
         <p:spPr/>
         <p:txBody>
           <a:bodyPr/>
-          <a:lstStyle/>
-          <a:p>
-            <a:r>
-              <a:rPr lang="en-US" smtClean="0"/>
+          <a:lstStyle>
+            <a:lvl1pPr>
+              <a:defRPr/>
+            </a:lvl1pPr>
+          </a:lstStyle>
+          <a:p>
+            <a:r>
+              <a:rPr lang="en-US" dirty="0" smtClean="0">
+                <a:latin typeface="Chiller" panose="04020404031007020602" pitchFamily="82" charset="0"/>
+              </a:rPr>
               <a:t>Team Lich</a:t>
             </a:r>
-            <a:endParaRPr lang="en-US" dirty="0"/>
+            <a:endParaRPr lang="en-US" dirty="0">
+              <a:latin typeface="Chiller" panose="04020404031007020602" pitchFamily="82" charset="0"/>
+            </a:endParaRPr>
           </a:p>
         </p:txBody>
       </p:sp>
@@ -3534,13 +3498,21 @@
         <p:spPr/>
         <p:txBody>
           <a:bodyPr/>
-          <a:lstStyle/>
-          <a:p>
-            <a:r>
-              <a:rPr lang="en-US" smtClean="0"/>
+          <a:lstStyle>
+            <a:lvl1pPr>
+              <a:defRPr/>
+            </a:lvl1pPr>
+          </a:lstStyle>
+          <a:p>
+            <a:r>
+              <a:rPr lang="en-US" dirty="0" smtClean="0">
+                <a:latin typeface="Chiller" panose="04020404031007020602" pitchFamily="82" charset="0"/>
+              </a:rPr>
               <a:t>Team Lich</a:t>
             </a:r>
-            <a:endParaRPr lang="en-US" dirty="0"/>
+            <a:endParaRPr lang="en-US" dirty="0">
+              <a:latin typeface="Chiller" panose="04020404031007020602" pitchFamily="82" charset="0"/>
+            </a:endParaRPr>
           </a:p>
         </p:txBody>
       </p:sp>
@@ -3715,13 +3687,21 @@
         <p:spPr/>
         <p:txBody>
           <a:bodyPr/>
-          <a:lstStyle/>
-          <a:p>
-            <a:r>
-              <a:rPr lang="en-US" smtClean="0"/>
+          <a:lstStyle>
+            <a:lvl1pPr>
+              <a:defRPr/>
+            </a:lvl1pPr>
+          </a:lstStyle>
+          <a:p>
+            <a:r>
+              <a:rPr lang="en-US" dirty="0" smtClean="0">
+                <a:latin typeface="Chiller" panose="04020404031007020602" pitchFamily="82" charset="0"/>
+              </a:rPr>
               <a:t>Team Lich</a:t>
             </a:r>
-            <a:endParaRPr lang="en-US" dirty="0"/>
+            <a:endParaRPr lang="en-US" dirty="0">
+              <a:latin typeface="Chiller" panose="04020404031007020602" pitchFamily="82" charset="0"/>
+            </a:endParaRPr>
           </a:p>
         </p:txBody>
       </p:sp>
@@ -3906,13 +3886,21 @@
         <p:spPr/>
         <p:txBody>
           <a:bodyPr/>
-          <a:lstStyle/>
-          <a:p>
-            <a:r>
-              <a:rPr lang="en-US" smtClean="0"/>
+          <a:lstStyle>
+            <a:lvl1pPr>
+              <a:defRPr/>
+            </a:lvl1pPr>
+          </a:lstStyle>
+          <a:p>
+            <a:r>
+              <a:rPr lang="en-US" dirty="0" smtClean="0">
+                <a:latin typeface="Chiller" panose="04020404031007020602" pitchFamily="82" charset="0"/>
+              </a:rPr>
               <a:t>Team Lich</a:t>
             </a:r>
-            <a:endParaRPr lang="en-US" dirty="0"/>
+            <a:endParaRPr lang="en-US" dirty="0">
+              <a:latin typeface="Chiller" panose="04020404031007020602" pitchFamily="82" charset="0"/>
+            </a:endParaRPr>
           </a:p>
         </p:txBody>
       </p:sp>
@@ -4087,13 +4075,21 @@
         <p:spPr/>
         <p:txBody>
           <a:bodyPr/>
-          <a:lstStyle/>
-          <a:p>
-            <a:r>
-              <a:rPr lang="en-US" smtClean="0"/>
+          <a:lstStyle>
+            <a:lvl1pPr>
+              <a:defRPr/>
+            </a:lvl1pPr>
+          </a:lstStyle>
+          <a:p>
+            <a:r>
+              <a:rPr lang="en-US" dirty="0" smtClean="0">
+                <a:latin typeface="Chiller" panose="04020404031007020602" pitchFamily="82" charset="0"/>
+              </a:rPr>
               <a:t>Team Lich</a:t>
             </a:r>
-            <a:endParaRPr lang="en-US" dirty="0"/>
+            <a:endParaRPr lang="en-US" dirty="0">
+              <a:latin typeface="Chiller" panose="04020404031007020602" pitchFamily="82" charset="0"/>
+            </a:endParaRPr>
           </a:p>
         </p:txBody>
       </p:sp>
@@ -4342,13 +4338,21 @@
         <p:spPr/>
         <p:txBody>
           <a:bodyPr/>
-          <a:lstStyle/>
-          <a:p>
-            <a:r>
-              <a:rPr lang="en-US" smtClean="0"/>
+          <a:lstStyle>
+            <a:lvl1pPr>
+              <a:defRPr/>
+            </a:lvl1pPr>
+          </a:lstStyle>
+          <a:p>
+            <a:r>
+              <a:rPr lang="en-US" dirty="0" smtClean="0">
+                <a:latin typeface="Chiller" panose="04020404031007020602" pitchFamily="82" charset="0"/>
+              </a:rPr>
               <a:t>Team Lich</a:t>
             </a:r>
-            <a:endParaRPr lang="en-US" dirty="0"/>
+            <a:endParaRPr lang="en-US" dirty="0">
+              <a:latin typeface="Chiller" panose="04020404031007020602" pitchFamily="82" charset="0"/>
+            </a:endParaRPr>
           </a:p>
         </p:txBody>
       </p:sp>
@@ -4645,13 +4649,21 @@
         <p:spPr/>
         <p:txBody>
           <a:bodyPr/>
-          <a:lstStyle/>
-          <a:p>
-            <a:r>
-              <a:rPr lang="en-US" smtClean="0"/>
+          <a:lstStyle>
+            <a:lvl1pPr>
+              <a:defRPr/>
+            </a:lvl1pPr>
+          </a:lstStyle>
+          <a:p>
+            <a:r>
+              <a:rPr lang="en-US" dirty="0" smtClean="0">
+                <a:latin typeface="Chiller" panose="04020404031007020602" pitchFamily="82" charset="0"/>
+              </a:rPr>
               <a:t>Team Lich</a:t>
             </a:r>
-            <a:endParaRPr lang="en-US" dirty="0"/>
+            <a:endParaRPr lang="en-US" dirty="0">
+              <a:latin typeface="Chiller" panose="04020404031007020602" pitchFamily="82" charset="0"/>
+            </a:endParaRPr>
           </a:p>
         </p:txBody>
       </p:sp>
@@ -4688,6 +4700,13 @@
   <p:clrMapOvr>
     <a:masterClrMapping/>
   </p:clrMapOvr>
+  <p:timing>
+    <p:tnLst>
+      <p:par>
+        <p:cTn id="1" dur="indefinite" restart="never" nodeType="tmRoot"/>
+      </p:par>
+    </p:tnLst>
+  </p:timing>
 </p:sldLayout>
 </file>
 
@@ -5087,13 +5106,21 @@
         <p:spPr/>
         <p:txBody>
           <a:bodyPr/>
-          <a:lstStyle/>
-          <a:p>
-            <a:r>
-              <a:rPr lang="en-US" smtClean="0"/>
+          <a:lstStyle>
+            <a:lvl1pPr>
+              <a:defRPr/>
+            </a:lvl1pPr>
+          </a:lstStyle>
+          <a:p>
+            <a:r>
+              <a:rPr lang="en-US" dirty="0" smtClean="0">
+                <a:latin typeface="Chiller" panose="04020404031007020602" pitchFamily="82" charset="0"/>
+              </a:rPr>
               <a:t>Team Lich</a:t>
             </a:r>
-            <a:endParaRPr lang="en-US" dirty="0"/>
+            <a:endParaRPr lang="en-US" dirty="0">
+              <a:latin typeface="Chiller" panose="04020404031007020602" pitchFamily="82" charset="0"/>
+            </a:endParaRPr>
           </a:p>
         </p:txBody>
       </p:sp>
@@ -5216,13 +5243,21 @@
         <p:spPr/>
         <p:txBody>
           <a:bodyPr/>
-          <a:lstStyle/>
-          <a:p>
-            <a:r>
-              <a:rPr lang="en-US" smtClean="0"/>
+          <a:lstStyle>
+            <a:lvl1pPr>
+              <a:defRPr/>
+            </a:lvl1pPr>
+          </a:lstStyle>
+          <a:p>
+            <a:r>
+              <a:rPr lang="en-US" dirty="0" smtClean="0">
+                <a:latin typeface="Chiller" panose="04020404031007020602" pitchFamily="82" charset="0"/>
+              </a:rPr>
               <a:t>Team Lich</a:t>
             </a:r>
-            <a:endParaRPr lang="en-US" dirty="0"/>
+            <a:endParaRPr lang="en-US" dirty="0">
+              <a:latin typeface="Chiller" panose="04020404031007020602" pitchFamily="82" charset="0"/>
+            </a:endParaRPr>
           </a:p>
         </p:txBody>
       </p:sp>
@@ -5322,13 +5357,21 @@
         <p:spPr/>
         <p:txBody>
           <a:bodyPr/>
-          <a:lstStyle/>
-          <a:p>
-            <a:r>
-              <a:rPr lang="en-US" smtClean="0"/>
+          <a:lstStyle>
+            <a:lvl1pPr>
+              <a:defRPr/>
+            </a:lvl1pPr>
+          </a:lstStyle>
+          <a:p>
+            <a:r>
+              <a:rPr lang="en-US" dirty="0" smtClean="0">
+                <a:latin typeface="Chiller" panose="04020404031007020602" pitchFamily="82" charset="0"/>
+              </a:rPr>
               <a:t>Team Lich</a:t>
             </a:r>
-            <a:endParaRPr lang="en-US" dirty="0"/>
+            <a:endParaRPr lang="en-US" dirty="0">
+              <a:latin typeface="Chiller" panose="04020404031007020602" pitchFamily="82" charset="0"/>
+            </a:endParaRPr>
           </a:p>
         </p:txBody>
       </p:sp>
@@ -5365,6 +5408,13 @@
   <p:clrMapOvr>
     <a:masterClrMapping/>
   </p:clrMapOvr>
+  <p:timing>
+    <p:tnLst>
+      <p:par>
+        <p:cTn id="1" dur="indefinite" restart="never" nodeType="tmRoot"/>
+      </p:par>
+    </p:tnLst>
+  </p:timing>
 </p:sldLayout>
 </file>
 
@@ -5605,13 +5655,21 @@
         <p:spPr/>
         <p:txBody>
           <a:bodyPr/>
-          <a:lstStyle/>
-          <a:p>
-            <a:r>
-              <a:rPr lang="en-US" smtClean="0"/>
+          <a:lstStyle>
+            <a:lvl1pPr>
+              <a:defRPr/>
+            </a:lvl1pPr>
+          </a:lstStyle>
+          <a:p>
+            <a:r>
+              <a:rPr lang="en-US" dirty="0" smtClean="0">
+                <a:latin typeface="Chiller" panose="04020404031007020602" pitchFamily="82" charset="0"/>
+              </a:rPr>
               <a:t>Team Lich</a:t>
             </a:r>
-            <a:endParaRPr lang="en-US" dirty="0"/>
+            <a:endParaRPr lang="en-US" dirty="0">
+              <a:latin typeface="Chiller" panose="04020404031007020602" pitchFamily="82" charset="0"/>
+            </a:endParaRPr>
           </a:p>
         </p:txBody>
       </p:sp>
@@ -5891,13 +5949,21 @@
         <p:spPr/>
         <p:txBody>
           <a:bodyPr/>
-          <a:lstStyle/>
-          <a:p>
-            <a:r>
-              <a:rPr lang="en-US" smtClean="0"/>
+          <a:lstStyle>
+            <a:lvl1pPr>
+              <a:defRPr/>
+            </a:lvl1pPr>
+          </a:lstStyle>
+          <a:p>
+            <a:r>
+              <a:rPr lang="en-US" dirty="0" smtClean="0">
+                <a:latin typeface="Chiller" panose="04020404031007020602" pitchFamily="82" charset="0"/>
+              </a:rPr>
               <a:t>Team Lich</a:t>
             </a:r>
-            <a:endParaRPr lang="en-US" dirty="0"/>
+            <a:endParaRPr lang="en-US" dirty="0">
+              <a:latin typeface="Chiller" panose="04020404031007020602" pitchFamily="82" charset="0"/>
+            </a:endParaRPr>
           </a:p>
         </p:txBody>
       </p:sp>
@@ -5945,7 +6011,7 @@
 </file>
 
 <file path=ppt/slideMasters/slideMaster1.xml><?xml version="1.0" encoding="utf-8"?>
-<p:sldMaster xmlns:a="http://schemas.openxmlformats.org/drawingml/2006/main" xmlns:r="http://schemas.openxmlformats.org/officeDocument/2006/relationships" xmlns:p="http://schemas.openxmlformats.org/presentationml/2006/main">
+<p:sldMaster xmlns:a="http://schemas.openxmlformats.org/drawingml/2006/main" xmlns:r="http://schemas.openxmlformats.org/officeDocument/2006/relationships" xmlns:p="http://schemas.openxmlformats.org/presentationml/2006/main" preserve="1">
   <p:cSld>
     <p:bg>
       <p:bgRef idx="1003">
@@ -5988,7 +6054,7 @@
         </p:blipFill>
         <p:spPr>
           <a:xfrm>
-            <a:off x="9904409" y="3233921"/>
+            <a:off x="9904409" y="3259321"/>
             <a:ext cx="2438405" cy="3624079"/>
           </a:xfrm>
           <a:prstGeom prst="rect">
@@ -6362,7 +6428,7 @@
         </p:nvSpPr>
         <p:spPr>
           <a:xfrm>
-            <a:off x="10437812" y="3233921"/>
+            <a:off x="10650938" y="3415520"/>
             <a:ext cx="1562101" cy="493123"/>
           </a:xfrm>
           <a:prstGeom prst="rect">
@@ -6373,7 +6439,7 @@
           <a:bodyPr vert="horz" lIns="91440" tIns="45720" rIns="91440" bIns="45720" rtlCol="0" anchor="b"/>
           <a:lstStyle>
             <a:lvl1pPr algn="l">
-              <a:defRPr sz="2000" b="0" i="0">
+              <a:defRPr sz="3200" b="0" i="0">
                 <a:solidFill>
                   <a:schemeClr val="accent4">
                     <a:lumMod val="20000"/>
@@ -6386,10 +6452,14 @@
           </a:lstStyle>
           <a:p>
             <a:r>
-              <a:rPr lang="en-US" dirty="0" smtClean="0"/>
+              <a:rPr lang="en-US" dirty="0" smtClean="0">
+                <a:latin typeface="Chiller" panose="04020404031007020602" pitchFamily="82" charset="0"/>
+              </a:rPr>
               <a:t>Team Lich</a:t>
             </a:r>
-            <a:endParaRPr lang="en-US" dirty="0"/>
+            <a:endParaRPr lang="en-US" dirty="0">
+              <a:latin typeface="Chiller" panose="04020404031007020602" pitchFamily="82" charset="0"/>
+            </a:endParaRPr>
           </a:p>
         </p:txBody>
       </p:sp>
@@ -6898,7 +6968,34 @@
       </p:sp>
       <p:sp>
         <p:nvSpPr>
-          <p:cNvPr id="4" name="Контейнер за номер на слайда 3"/>
+          <p:cNvPr id="4" name="Контейнер за долния колонтитул 3"/>
+          <p:cNvSpPr>
+            <a:spLocks noGrp="1"/>
+          </p:cNvSpPr>
+          <p:nvPr>
+            <p:ph type="ftr" sz="quarter" idx="11"/>
+          </p:nvPr>
+        </p:nvSpPr>
+        <p:spPr/>
+        <p:txBody>
+          <a:bodyPr/>
+          <a:lstStyle/>
+          <a:p>
+            <a:r>
+              <a:rPr lang="en-US" smtClean="0">
+                <a:latin typeface="Chiller" panose="04020404031007020602" pitchFamily="82" charset="0"/>
+              </a:rPr>
+              <a:t>Team Lich</a:t>
+            </a:r>
+            <a:endParaRPr lang="en-US" dirty="0">
+              <a:latin typeface="Chiller" panose="04020404031007020602" pitchFamily="82" charset="0"/>
+            </a:endParaRPr>
+          </a:p>
+        </p:txBody>
+      </p:sp>
+      <p:sp>
+        <p:nvSpPr>
+          <p:cNvPr id="5" name="Контейнер за номер на слайда 4"/>
           <p:cNvSpPr>
             <a:spLocks noGrp="1"/>
           </p:cNvSpPr>
@@ -6919,33 +7016,10 @@
           </a:p>
         </p:txBody>
       </p:sp>
-      <p:sp>
-        <p:nvSpPr>
-          <p:cNvPr id="5" name="Контейнер за долния колонтитул 4"/>
-          <p:cNvSpPr>
-            <a:spLocks noGrp="1"/>
-          </p:cNvSpPr>
-          <p:nvPr>
-            <p:ph type="ftr" sz="quarter" idx="11"/>
-          </p:nvPr>
-        </p:nvSpPr>
-        <p:spPr/>
-        <p:txBody>
-          <a:bodyPr/>
-          <a:lstStyle/>
-          <a:p>
-            <a:r>
-              <a:rPr lang="en-US" smtClean="0"/>
-              <a:t>Team Lich</a:t>
-            </a:r>
-            <a:endParaRPr lang="en-US" dirty="0"/>
-          </a:p>
-        </p:txBody>
-      </p:sp>
     </p:spTree>
     <p:extLst>
       <p:ext uri="{BB962C8B-B14F-4D97-AF65-F5344CB8AC3E}">
-        <p14:creationId xmlns:p14="http://schemas.microsoft.com/office/powerpoint/2010/main" val="3184497229"/>
+        <p14:creationId xmlns:p14="http://schemas.microsoft.com/office/powerpoint/2010/main" val="1250076201"/>
       </p:ext>
     </p:extLst>
   </p:cSld>
@@ -6981,20 +7055,15 @@
       </p:grpSpPr>
       <p:sp>
         <p:nvSpPr>
-          <p:cNvPr id="2" name="Заглавие 1"/>
-          <p:cNvSpPr>
-            <a:spLocks noGrp="1"/>
-          </p:cNvSpPr>
-          <p:nvPr>
-            <p:ph type="title"/>
-          </p:nvPr>
-        </p:nvSpPr>
-        <p:spPr>
-          <a:xfrm>
-            <a:off x="646111" y="452718"/>
-            <a:ext cx="9404723" cy="1400530"/>
-          </a:xfrm>
-        </p:spPr>
+          <p:cNvPr id="2" name="Контейнер за съдържание 1"/>
+          <p:cNvSpPr>
+            <a:spLocks noGrp="1"/>
+          </p:cNvSpPr>
+          <p:nvPr>
+            <p:ph idx="1"/>
+          </p:nvPr>
+        </p:nvSpPr>
+        <p:spPr/>
         <p:txBody>
           <a:bodyPr/>
           <a:lstStyle/>
@@ -7005,12 +7074,12 @@
       </p:sp>
       <p:sp>
         <p:nvSpPr>
-          <p:cNvPr id="3" name="Контейнер за съдържание 2"/>
-          <p:cNvSpPr>
-            <a:spLocks noGrp="1"/>
-          </p:cNvSpPr>
-          <p:nvPr>
-            <p:ph idx="1"/>
+          <p:cNvPr id="3" name="Заглавие 2"/>
+          <p:cNvSpPr>
+            <a:spLocks noGrp="1"/>
+          </p:cNvSpPr>
+          <p:nvPr>
+            <p:ph type="title"/>
           </p:nvPr>
         </p:nvSpPr>
         <p:spPr/>
@@ -7024,7 +7093,34 @@
       </p:sp>
       <p:sp>
         <p:nvSpPr>
-          <p:cNvPr id="4" name="Контейнер за номер на слайда 3"/>
+          <p:cNvPr id="4" name="Контейнер за долния колонтитул 3"/>
+          <p:cNvSpPr>
+            <a:spLocks noGrp="1"/>
+          </p:cNvSpPr>
+          <p:nvPr>
+            <p:ph type="ftr" sz="quarter" idx="11"/>
+          </p:nvPr>
+        </p:nvSpPr>
+        <p:spPr/>
+        <p:txBody>
+          <a:bodyPr/>
+          <a:lstStyle/>
+          <a:p>
+            <a:r>
+              <a:rPr lang="en-US" smtClean="0">
+                <a:latin typeface="Chiller" panose="04020404031007020602" pitchFamily="82" charset="0"/>
+              </a:rPr>
+              <a:t>Team Lich</a:t>
+            </a:r>
+            <a:endParaRPr lang="en-US" dirty="0">
+              <a:latin typeface="Chiller" panose="04020404031007020602" pitchFamily="82" charset="0"/>
+            </a:endParaRPr>
+          </a:p>
+        </p:txBody>
+      </p:sp>
+      <p:sp>
+        <p:nvSpPr>
+          <p:cNvPr id="5" name="Контейнер за номер на слайда 4"/>
           <p:cNvSpPr>
             <a:spLocks noGrp="1"/>
           </p:cNvSpPr>
@@ -7032,12 +7128,7 @@
             <p:ph type="sldNum" sz="quarter" idx="12"/>
           </p:nvPr>
         </p:nvSpPr>
-        <p:spPr>
-          <a:xfrm>
-            <a:off x="10352540" y="295729"/>
-            <a:ext cx="838199" cy="767687"/>
-          </a:xfrm>
-        </p:spPr>
+        <p:spPr/>
         <p:txBody>
           <a:bodyPr/>
           <a:lstStyle/>
@@ -7050,33 +7141,10 @@
           </a:p>
         </p:txBody>
       </p:sp>
-      <p:sp>
-        <p:nvSpPr>
-          <p:cNvPr id="5" name="Контейнер за долния колонтитул 4"/>
-          <p:cNvSpPr>
-            <a:spLocks noGrp="1"/>
-          </p:cNvSpPr>
-          <p:nvPr>
-            <p:ph type="ftr" sz="quarter" idx="11"/>
-          </p:nvPr>
-        </p:nvSpPr>
-        <p:spPr/>
-        <p:txBody>
-          <a:bodyPr/>
-          <a:lstStyle/>
-          <a:p>
-            <a:r>
-              <a:rPr lang="en-US" smtClean="0"/>
-              <a:t>Team Lich</a:t>
-            </a:r>
-            <a:endParaRPr lang="en-US" dirty="0"/>
-          </a:p>
-        </p:txBody>
-      </p:sp>
     </p:spTree>
     <p:extLst>
       <p:ext uri="{BB962C8B-B14F-4D97-AF65-F5344CB8AC3E}">
-        <p14:creationId xmlns:p14="http://schemas.microsoft.com/office/powerpoint/2010/main" val="3221823130"/>
+        <p14:creationId xmlns:p14="http://schemas.microsoft.com/office/powerpoint/2010/main" val="4092004348"/>
       </p:ext>
     </p:extLst>
   </p:cSld>

</xml_diff>